<commit_message>
Create charts for deployments, adding helm presentation parts
</commit_message>
<xml_diff>
--- a/presentation/dc_c2.pptx
+++ b/presentation/dc_c2.pptx
@@ -5,32 +5,29 @@
     <p:sldMasterId id="2147483733" r:id="rId1"/>
   </p:sldMasterIdLst>
   <p:notesMasterIdLst>
-    <p:notesMasterId r:id="rId22"/>
+    <p:notesMasterId r:id="rId19"/>
   </p:notesMasterIdLst>
   <p:handoutMasterIdLst>
-    <p:handoutMasterId r:id="rId23"/>
+    <p:handoutMasterId r:id="rId20"/>
   </p:handoutMasterIdLst>
   <p:sldIdLst>
     <p:sldId id="434" r:id="rId2"/>
     <p:sldId id="344" r:id="rId3"/>
-    <p:sldId id="416" r:id="rId4"/>
-    <p:sldId id="430" r:id="rId5"/>
-    <p:sldId id="364" r:id="rId6"/>
+    <p:sldId id="430" r:id="rId4"/>
+    <p:sldId id="364" r:id="rId5"/>
+    <p:sldId id="440" r:id="rId6"/>
     <p:sldId id="388" r:id="rId7"/>
-    <p:sldId id="439" r:id="rId8"/>
-    <p:sldId id="374" r:id="rId9"/>
-    <p:sldId id="380" r:id="rId10"/>
-    <p:sldId id="379" r:id="rId11"/>
-    <p:sldId id="394" r:id="rId12"/>
-    <p:sldId id="423" r:id="rId13"/>
-    <p:sldId id="387" r:id="rId14"/>
-    <p:sldId id="390" r:id="rId15"/>
-    <p:sldId id="420" r:id="rId16"/>
-    <p:sldId id="421" r:id="rId17"/>
-    <p:sldId id="422" r:id="rId18"/>
-    <p:sldId id="413" r:id="rId19"/>
-    <p:sldId id="265" r:id="rId20"/>
-    <p:sldId id="435" r:id="rId21"/>
+    <p:sldId id="441" r:id="rId8"/>
+    <p:sldId id="380" r:id="rId9"/>
+    <p:sldId id="379" r:id="rId10"/>
+    <p:sldId id="387" r:id="rId11"/>
+    <p:sldId id="390" r:id="rId12"/>
+    <p:sldId id="420" r:id="rId13"/>
+    <p:sldId id="421" r:id="rId14"/>
+    <p:sldId id="422" r:id="rId15"/>
+    <p:sldId id="413" r:id="rId16"/>
+    <p:sldId id="265" r:id="rId17"/>
+    <p:sldId id="435" r:id="rId18"/>
   </p:sldIdLst>
   <p:sldSz cx="12195175" cy="6858000"/>
   <p:notesSz cx="6797675" cy="9928225"/>
@@ -625,37 +622,6 @@
       </p:grpSpPr>
       <p:sp>
         <p:nvSpPr>
-          <p:cNvPr id="2" name="Slide Image Placeholder 1"/>
-          <p:cNvSpPr>
-            <a:spLocks noGrp="1" noRot="1" noChangeAspect="1"/>
-          </p:cNvSpPr>
-          <p:nvPr>
-            <p:ph type="sldImg"/>
-          </p:nvPr>
-        </p:nvSpPr>
-        <p:spPr/>
-      </p:sp>
-      <p:sp>
-        <p:nvSpPr>
-          <p:cNvPr id="3" name="Notes Placeholder 2"/>
-          <p:cNvSpPr>
-            <a:spLocks noGrp="1"/>
-          </p:cNvSpPr>
-          <p:nvPr>
-            <p:ph type="body" idx="1"/>
-          </p:nvPr>
-        </p:nvSpPr>
-        <p:spPr/>
-        <p:txBody>
-          <a:bodyPr/>
-          <a:lstStyle/>
-          <a:p>
-            <a:endParaRPr lang="en-US" sz="900" dirty="0"/>
-          </a:p>
-        </p:txBody>
-      </p:sp>
-      <p:sp>
-        <p:nvSpPr>
           <p:cNvPr id="4" name="Slide Number Placeholder 3"/>
           <p:cNvSpPr>
             <a:spLocks noGrp="1"/>
@@ -672,61 +638,7 @@
             <a:fld id="{7D8C2C35-2B8A-446E-BEC0-FD36716C29AC}" type="slidenum">
               <a:rPr lang="de-DE" smtClean="0"/>
               <a:pPr/>
-              <a:t>3</a:t>
-            </a:fld>
-            <a:endParaRPr lang="de-DE" dirty="0"/>
-          </a:p>
-        </p:txBody>
-      </p:sp>
-    </p:spTree>
-    <p:extLst>
-      <p:ext uri="{BB962C8B-B14F-4D97-AF65-F5344CB8AC3E}">
-        <p14:creationId xmlns:p14="http://schemas.microsoft.com/office/powerpoint/2010/main" val="1278075918"/>
-      </p:ext>
-    </p:extLst>
-  </p:cSld>
-  <p:clrMapOvr>
-    <a:masterClrMapping/>
-  </p:clrMapOvr>
-</p:notes>
-</file>
-
-<file path=ppt/notesSlides/notesSlide3.xml><?xml version="1.0" encoding="utf-8"?>
-<p:notes xmlns:a="http://schemas.openxmlformats.org/drawingml/2006/main" xmlns:r="http://schemas.openxmlformats.org/officeDocument/2006/relationships" xmlns:p="http://schemas.openxmlformats.org/presentationml/2006/main">
-  <p:cSld>
-    <p:spTree>
-      <p:nvGrpSpPr>
-        <p:cNvPr id="1" name=""/>
-        <p:cNvGrpSpPr/>
-        <p:nvPr/>
-      </p:nvGrpSpPr>
-      <p:grpSpPr>
-        <a:xfrm>
-          <a:off x="0" y="0"/>
-          <a:ext cx="0" cy="0"/>
-          <a:chOff x="0" y="0"/>
-          <a:chExt cx="0" cy="0"/>
-        </a:xfrm>
-      </p:grpSpPr>
-      <p:sp>
-        <p:nvSpPr>
-          <p:cNvPr id="4" name="Slide Number Placeholder 3"/>
-          <p:cNvSpPr>
-            <a:spLocks noGrp="1"/>
-          </p:cNvSpPr>
-          <p:nvPr>
-            <p:ph type="sldNum" sz="quarter" idx="10"/>
-          </p:nvPr>
-        </p:nvSpPr>
-        <p:spPr/>
-        <p:txBody>
-          <a:bodyPr/>
-          <a:lstStyle/>
-          <a:p>
-            <a:fld id="{7D8C2C35-2B8A-446E-BEC0-FD36716C29AC}" type="slidenum">
-              <a:rPr lang="de-DE" smtClean="0"/>
-              <a:pPr/>
-              <a:t>19</a:t>
+              <a:t>16</a:t>
             </a:fld>
             <a:endParaRPr lang="de-DE" dirty="0"/>
           </a:p>
@@ -1173,7 +1085,7 @@
           <a:blip r:embed="rId3">
             <a:extLst>
               <a:ext uri="{28A0092B-C50C-407E-A947-70E740481C1C}">
-                <a14:useLocalDpi xmlns:a14="http://schemas.microsoft.com/office/drawing/2010/main" val="0"/>
+                <a14:useLocalDpi xmlns:a14="http://schemas.microsoft.com/office/drawing/2010/main"/>
               </a:ext>
             </a:extLst>
           </a:blip>
@@ -4682,7 +4594,7 @@
           <a:blip r:embed="rId3">
             <a:extLst>
               <a:ext uri="{28A0092B-C50C-407E-A947-70E740481C1C}">
-                <a14:useLocalDpi xmlns:a14="http://schemas.microsoft.com/office/drawing/2010/main" val="0"/>
+                <a14:useLocalDpi xmlns:a14="http://schemas.microsoft.com/office/drawing/2010/main"/>
               </a:ext>
             </a:extLst>
           </a:blip>
@@ -5615,7 +5527,7 @@
           <a:blip r:embed="rId3">
             <a:extLst>
               <a:ext uri="{28A0092B-C50C-407E-A947-70E740481C1C}">
-                <a14:useLocalDpi xmlns:a14="http://schemas.microsoft.com/office/drawing/2010/main" val="0"/>
+                <a14:useLocalDpi xmlns:a14="http://schemas.microsoft.com/office/drawing/2010/main"/>
               </a:ext>
             </a:extLst>
           </a:blip>
@@ -6072,7 +5984,13 @@
           <p:nvPr userDrawn="1"/>
         </p:nvPicPr>
         <p:blipFill rotWithShape="1">
-          <a:blip r:embed="rId10"/>
+          <a:blip r:embed="rId10">
+            <a:extLst>
+              <a:ext uri="{28A0092B-C50C-407E-A947-70E740481C1C}">
+                <a14:useLocalDpi xmlns:a14="http://schemas.microsoft.com/office/drawing/2010/main"/>
+              </a:ext>
+            </a:extLst>
+          </a:blip>
           <a:srcRect l="13793" t="1405" r="17847" b="2165"/>
           <a:stretch/>
         </p:blipFill>
@@ -6123,7 +6041,13 @@
           <p:nvPr userDrawn="1"/>
         </p:nvPicPr>
         <p:blipFill>
-          <a:blip r:embed="rId14"/>
+          <a:blip r:embed="rId14">
+            <a:extLst>
+              <a:ext uri="{28A0092B-C50C-407E-A947-70E740481C1C}">
+                <a14:useLocalDpi xmlns:a14="http://schemas.microsoft.com/office/drawing/2010/main"/>
+              </a:ext>
+            </a:extLst>
+          </a:blip>
           <a:stretch>
             <a:fillRect/>
           </a:stretch>
@@ -6222,7 +6146,7 @@
           <a:blip r:embed="rId15">
             <a:extLst>
               <a:ext uri="{28A0092B-C50C-407E-A947-70E740481C1C}">
-                <a14:useLocalDpi xmlns:a14="http://schemas.microsoft.com/office/drawing/2010/main" val="0"/>
+                <a14:useLocalDpi xmlns:a14="http://schemas.microsoft.com/office/drawing/2010/main"/>
               </a:ext>
             </a:extLst>
           </a:blip>
@@ -6644,7 +6568,13 @@
           <p:nvPr userDrawn="1"/>
         </p:nvPicPr>
         <p:blipFill rotWithShape="1">
-          <a:blip r:embed="rId10"/>
+          <a:blip r:embed="rId10">
+            <a:extLst>
+              <a:ext uri="{28A0092B-C50C-407E-A947-70E740481C1C}">
+                <a14:useLocalDpi xmlns:a14="http://schemas.microsoft.com/office/drawing/2010/main"/>
+              </a:ext>
+            </a:extLst>
+          </a:blip>
           <a:srcRect l="13793" t="1405" r="17847" b="2165"/>
           <a:stretch/>
         </p:blipFill>
@@ -6695,7 +6625,13 @@
           <p:nvPr userDrawn="1"/>
         </p:nvPicPr>
         <p:blipFill>
-          <a:blip r:embed="rId14"/>
+          <a:blip r:embed="rId14">
+            <a:extLst>
+              <a:ext uri="{28A0092B-C50C-407E-A947-70E740481C1C}">
+                <a14:useLocalDpi xmlns:a14="http://schemas.microsoft.com/office/drawing/2010/main"/>
+              </a:ext>
+            </a:extLst>
+          </a:blip>
           <a:stretch>
             <a:fillRect/>
           </a:stretch>
@@ -6775,7 +6711,7 @@
           <a:blip r:embed="rId15">
             <a:extLst>
               <a:ext uri="{28A0092B-C50C-407E-A947-70E740481C1C}">
-                <a14:useLocalDpi xmlns:a14="http://schemas.microsoft.com/office/drawing/2010/main" val="0"/>
+                <a14:useLocalDpi xmlns:a14="http://schemas.microsoft.com/office/drawing/2010/main"/>
               </a:ext>
             </a:extLst>
           </a:blip>
@@ -7207,7 +7143,7 @@
           <a:blip r:embed="rId3">
             <a:extLst>
               <a:ext uri="{28A0092B-C50C-407E-A947-70E740481C1C}">
-                <a14:useLocalDpi xmlns:a14="http://schemas.microsoft.com/office/drawing/2010/main" val="0"/>
+                <a14:useLocalDpi xmlns:a14="http://schemas.microsoft.com/office/drawing/2010/main"/>
               </a:ext>
             </a:extLst>
           </a:blip>
@@ -7870,7 +7806,7 @@
           <a:blip r:embed="rId3">
             <a:extLst>
               <a:ext uri="{28A0092B-C50C-407E-A947-70E740481C1C}">
-                <a14:useLocalDpi xmlns:a14="http://schemas.microsoft.com/office/drawing/2010/main" val="0"/>
+                <a14:useLocalDpi xmlns:a14="http://schemas.microsoft.com/office/drawing/2010/main"/>
               </a:ext>
             </a:extLst>
           </a:blip>
@@ -9630,8 +9566,14 @@
           </p:nvPr>
         </p:nvPicPr>
         <p:blipFill>
-          <a:blip r:embed="rId2"/>
-          <a:srcRect t="16" b="16"/>
+          <a:blip r:embed="rId2">
+            <a:extLst>
+              <a:ext uri="{28A0092B-C50C-407E-A947-70E740481C1C}">
+                <a14:useLocalDpi xmlns:a14="http://schemas.microsoft.com/office/drawing/2010/main"/>
+              </a:ext>
+            </a:extLst>
+          </a:blip>
+          <a:srcRect/>
           <a:stretch>
             <a:fillRect/>
           </a:stretch>
@@ -9695,24 +9637,12 @@
       </p:grpSpPr>
       <p:sp>
         <p:nvSpPr>
-          <p:cNvPr id="6" name="Picture Placeholder" descr="Placeholder for an image" title="Image placeholder content slide"/>
+          <p:cNvPr id="7" name="Title"/>
           <p:cNvSpPr>
             <a:spLocks noGrp="1"/>
           </p:cNvSpPr>
           <p:nvPr>
-            <p:ph type="pic" sz="quarter" idx="10"/>
-          </p:nvPr>
-        </p:nvSpPr>
-        <p:spPr/>
-      </p:sp>
-      <p:sp>
-        <p:nvSpPr>
-          <p:cNvPr id="4" name="Text Placeholder"/>
-          <p:cNvSpPr>
-            <a:spLocks noGrp="1"/>
-          </p:cNvSpPr>
-          <p:nvPr>
-            <p:ph type="body" sz="quarter" idx="11"/>
+            <p:ph type="ctrTitle"/>
           </p:nvPr>
         </p:nvSpPr>
         <p:spPr/>
@@ -9720,47 +9650,21 @@
           <a:bodyPr/>
           <a:lstStyle/>
           <a:p>
-            <a:pPr lvl="0"/>
-            <a:r>
-              <a:rPr lang="en-US"/>
-              <a:t>First level</a:t>
-            </a:r>
-          </a:p>
-          <a:p>
-            <a:pPr lvl="1"/>
-            <a:r>
-              <a:rPr lang="en-US"/>
-              <a:t>Second level</a:t>
-            </a:r>
-          </a:p>
-          <a:p>
-            <a:pPr lvl="2"/>
-            <a:r>
-              <a:rPr lang="en-US"/>
-              <a:t>Third level</a:t>
-            </a:r>
-            <a:endParaRPr lang="en-US" dirty="0"/>
-          </a:p>
-        </p:txBody>
-      </p:sp>
-      <p:sp>
-        <p:nvSpPr>
-          <p:cNvPr id="2" name="Title"/>
-          <p:cNvSpPr>
-            <a:spLocks noGrp="1"/>
-          </p:cNvSpPr>
-          <p:nvPr>
-            <p:ph type="title"/>
-          </p:nvPr>
-        </p:nvSpPr>
-        <p:spPr/>
-        <p:txBody>
-          <a:bodyPr/>
-          <a:lstStyle/>
-          <a:p>
-            <a:r>
-              <a:rPr lang="en-US" dirty="0"/>
-              <a:t>Insert page title (sentence case)</a:t>
+            <a:r>
+              <a:rPr lang="en-US" dirty="0"/>
+              <a:t>Lets </a:t>
+            </a:r>
+            <a:r>
+              <a:rPr lang="en-US" dirty="0">
+                <a:solidFill>
+                  <a:schemeClr val="accent1"/>
+                </a:solidFill>
+              </a:rPr>
+              <a:t>improve</a:t>
+            </a:r>
+            <a:r>
+              <a:rPr lang="en-US" dirty="0"/>
+              <a:t> the previous deployment – Rolling Release</a:t>
             </a:r>
           </a:p>
         </p:txBody>
@@ -9768,7 +9672,7 @@
     </p:spTree>
     <p:extLst>
       <p:ext uri="{BB962C8B-B14F-4D97-AF65-F5344CB8AC3E}">
-        <p14:creationId xmlns:p14="http://schemas.microsoft.com/office/powerpoint/2010/main" val="4154867534"/>
+        <p14:creationId xmlns:p14="http://schemas.microsoft.com/office/powerpoint/2010/main" val="854015491"/>
       </p:ext>
     </p:extLst>
   </p:cSld>
@@ -9797,20 +9701,144 @@
       </p:grpSpPr>
       <p:sp>
         <p:nvSpPr>
-          <p:cNvPr id="9" name="Picture Placeholder" descr="Placeholder for an image full screen with second motion band" title="Image placeholder content slide"/>
+          <p:cNvPr id="5" name="Text Placeholder column 3"/>
           <p:cNvSpPr>
             <a:spLocks noGrp="1"/>
           </p:cNvSpPr>
           <p:nvPr>
-            <p:ph type="pic" sz="quarter" idx="10"/>
+            <p:ph type="body" sz="quarter" idx="13"/>
           </p:nvPr>
         </p:nvSpPr>
         <p:spPr/>
+        <p:txBody>
+          <a:bodyPr/>
+          <a:lstStyle/>
+          <a:p>
+            <a:pPr lvl="0"/>
+            <a:r>
+              <a:rPr lang="en-US"/>
+              <a:t>First level</a:t>
+            </a:r>
+          </a:p>
+          <a:p>
+            <a:pPr lvl="1"/>
+            <a:r>
+              <a:rPr lang="en-US"/>
+              <a:t>Second level</a:t>
+            </a:r>
+          </a:p>
+          <a:p>
+            <a:pPr lvl="2"/>
+            <a:r>
+              <a:rPr lang="en-US"/>
+              <a:t>Third level</a:t>
+            </a:r>
+            <a:endParaRPr lang="en-US" dirty="0"/>
+          </a:p>
+        </p:txBody>
+      </p:sp>
+      <p:sp>
+        <p:nvSpPr>
+          <p:cNvPr id="4" name="Text Placeholder column 2"/>
+          <p:cNvSpPr>
+            <a:spLocks noGrp="1"/>
+          </p:cNvSpPr>
+          <p:nvPr>
+            <p:ph type="body" sz="quarter" idx="12"/>
+          </p:nvPr>
+        </p:nvSpPr>
+        <p:spPr/>
+        <p:txBody>
+          <a:bodyPr/>
+          <a:lstStyle/>
+          <a:p>
+            <a:pPr lvl="0"/>
+            <a:r>
+              <a:rPr lang="en-US"/>
+              <a:t>First level</a:t>
+            </a:r>
+          </a:p>
+          <a:p>
+            <a:pPr lvl="1"/>
+            <a:r>
+              <a:rPr lang="en-US"/>
+              <a:t>Second level</a:t>
+            </a:r>
+          </a:p>
+          <a:p>
+            <a:pPr lvl="2"/>
+            <a:r>
+              <a:rPr lang="en-US"/>
+              <a:t>Third level</a:t>
+            </a:r>
+            <a:endParaRPr lang="en-US" dirty="0"/>
+          </a:p>
+        </p:txBody>
+      </p:sp>
+      <p:sp>
+        <p:nvSpPr>
+          <p:cNvPr id="3" name="Text Placeholder column 1"/>
+          <p:cNvSpPr>
+            <a:spLocks noGrp="1"/>
+          </p:cNvSpPr>
+          <p:nvPr>
+            <p:ph type="body" sz="quarter" idx="10"/>
+          </p:nvPr>
+        </p:nvSpPr>
+        <p:spPr/>
+        <p:txBody>
+          <a:bodyPr/>
+          <a:lstStyle/>
+          <a:p>
+            <a:pPr lvl="0"/>
+            <a:r>
+              <a:rPr lang="en-US"/>
+              <a:t>First level</a:t>
+            </a:r>
+          </a:p>
+          <a:p>
+            <a:pPr lvl="1"/>
+            <a:r>
+              <a:rPr lang="en-US"/>
+              <a:t>Second level</a:t>
+            </a:r>
+          </a:p>
+          <a:p>
+            <a:pPr lvl="2"/>
+            <a:r>
+              <a:rPr lang="en-US"/>
+              <a:t>Third level</a:t>
+            </a:r>
+            <a:endParaRPr lang="en-US" dirty="0"/>
+          </a:p>
+        </p:txBody>
+      </p:sp>
+      <p:sp>
+        <p:nvSpPr>
+          <p:cNvPr id="2" name="Title"/>
+          <p:cNvSpPr>
+            <a:spLocks noGrp="1"/>
+          </p:cNvSpPr>
+          <p:nvPr>
+            <p:ph type="title"/>
+          </p:nvPr>
+        </p:nvSpPr>
+        <p:spPr/>
+        <p:txBody>
+          <a:bodyPr/>
+          <a:lstStyle/>
+          <a:p>
+            <a:r>
+              <a:rPr lang="en-US" dirty="0"/>
+              <a:t>Insert page title (sentence case)</a:t>
+            </a:r>
+          </a:p>
+        </p:txBody>
       </p:sp>
     </p:spTree>
     <p:extLst>
       <p:ext uri="{BB962C8B-B14F-4D97-AF65-F5344CB8AC3E}">
-        <p14:creationId xmlns:p14="http://schemas.microsoft.com/office/powerpoint/2010/main" val="3324205101"/>
+        <p14:creationId xmlns:p14="http://schemas.microsoft.com/office/powerpoint/2010/main" val="94846162"/>
       </p:ext>
     </p:extLst>
   </p:cSld>
@@ -9839,20 +9867,114 @@
       </p:grpSpPr>
       <p:sp>
         <p:nvSpPr>
-          <p:cNvPr id="2" name="Picture Placeholder" title="Image placeholder content slide"/>
+          <p:cNvPr id="10" name="Text Placeholder column 2"/>
           <p:cNvSpPr>
             <a:spLocks noGrp="1"/>
           </p:cNvSpPr>
           <p:nvPr>
-            <p:ph type="pic" sz="quarter" idx="10"/>
+            <p:ph type="body" sz="quarter" idx="13"/>
           </p:nvPr>
         </p:nvSpPr>
         <p:spPr/>
+        <p:txBody>
+          <a:bodyPr/>
+          <a:lstStyle/>
+          <a:p>
+            <a:pPr lvl="0"/>
+            <a:r>
+              <a:rPr lang="en-US" dirty="0"/>
+              <a:t>First level</a:t>
+            </a:r>
+          </a:p>
+          <a:p>
+            <a:pPr lvl="1"/>
+            <a:r>
+              <a:rPr lang="en-US" dirty="0"/>
+              <a:t>Second level</a:t>
+            </a:r>
+          </a:p>
+        </p:txBody>
+      </p:sp>
+      <p:sp>
+        <p:nvSpPr>
+          <p:cNvPr id="16" name="Picture Placeholder 2" descr="Image placeholder right" title="Image placeholder"/>
+          <p:cNvSpPr>
+            <a:spLocks noGrp="1"/>
+          </p:cNvSpPr>
+          <p:nvPr>
+            <p:ph type="pic" sz="quarter" idx="14"/>
+          </p:nvPr>
+        </p:nvSpPr>
+        <p:spPr/>
+      </p:sp>
+      <p:sp>
+        <p:nvSpPr>
+          <p:cNvPr id="3" name="Text Placeholder column 1"/>
+          <p:cNvSpPr>
+            <a:spLocks noGrp="1"/>
+          </p:cNvSpPr>
+          <p:nvPr>
+            <p:ph type="body" sz="quarter" idx="10"/>
+          </p:nvPr>
+        </p:nvSpPr>
+        <p:spPr/>
+        <p:txBody>
+          <a:bodyPr/>
+          <a:lstStyle/>
+          <a:p>
+            <a:pPr lvl="0"/>
+            <a:r>
+              <a:rPr lang="en-US" dirty="0"/>
+              <a:t>First level</a:t>
+            </a:r>
+          </a:p>
+          <a:p>
+            <a:pPr lvl="1"/>
+            <a:r>
+              <a:rPr lang="en-US" dirty="0"/>
+              <a:t>Second level</a:t>
+            </a:r>
+          </a:p>
+        </p:txBody>
+      </p:sp>
+      <p:sp>
+        <p:nvSpPr>
+          <p:cNvPr id="15" name="Picture Placeholder 1" descr="Image placeholder left" title="Image placeholde"/>
+          <p:cNvSpPr>
+            <a:spLocks noGrp="1"/>
+          </p:cNvSpPr>
+          <p:nvPr>
+            <p:ph type="pic" sz="quarter" idx="12"/>
+          </p:nvPr>
+        </p:nvSpPr>
+        <p:spPr/>
+      </p:sp>
+      <p:sp>
+        <p:nvSpPr>
+          <p:cNvPr id="8" name="Title"/>
+          <p:cNvSpPr>
+            <a:spLocks noGrp="1"/>
+          </p:cNvSpPr>
+          <p:nvPr>
+            <p:ph type="title"/>
+          </p:nvPr>
+        </p:nvSpPr>
+        <p:spPr/>
+        <p:txBody>
+          <a:bodyPr/>
+          <a:lstStyle/>
+          <a:p>
+            <a:r>
+              <a:rPr lang="en-US" dirty="0"/>
+              <a:t>Insert page title (sentence case)</a:t>
+            </a:r>
+          </a:p>
+        </p:txBody>
       </p:sp>
     </p:spTree>
     <p:extLst>
       <p:ext uri="{BB962C8B-B14F-4D97-AF65-F5344CB8AC3E}">
-        <p14:creationId xmlns:p14="http://schemas.microsoft.com/office/powerpoint/2010/main" val="1840057824"/>
+        <p14:creationId xmlns:p14="http://schemas.microsoft.com/office/powerpoint/2010/main" val="1504049518"/>
       </p:ext>
     </p:extLst>
   </p:cSld>
@@ -9881,12 +10003,12 @@
       </p:grpSpPr>
       <p:sp>
         <p:nvSpPr>
-          <p:cNvPr id="9" name="Text Placeholder column 2"/>
+          <p:cNvPr id="12" name="Text Placeholder column 3"/>
           <p:cNvSpPr>
             <a:spLocks noGrp="1"/>
           </p:cNvSpPr>
           <p:nvPr>
-            <p:ph type="body" sz="quarter" idx="11"/>
+            <p:ph type="body" sz="quarter" idx="13"/>
           </p:nvPr>
         </p:nvSpPr>
         <p:spPr/>
@@ -9896,30 +10018,76 @@
           <a:p>
             <a:pPr lvl="0"/>
             <a:r>
-              <a:rPr lang="en-US"/>
+              <a:rPr lang="en-US" dirty="0"/>
               <a:t>First level</a:t>
             </a:r>
           </a:p>
           <a:p>
             <a:pPr lvl="1"/>
             <a:r>
-              <a:rPr lang="en-US"/>
+              <a:rPr lang="en-US" dirty="0"/>
               <a:t>Second level</a:t>
             </a:r>
           </a:p>
-          <a:p>
-            <a:pPr lvl="2"/>
-            <a:r>
-              <a:rPr lang="en-US"/>
-              <a:t>Third level</a:t>
-            </a:r>
-            <a:endParaRPr lang="en-US" dirty="0"/>
-          </a:p>
         </p:txBody>
       </p:sp>
       <p:sp>
         <p:nvSpPr>
-          <p:cNvPr id="8" name="Text Placeholder column 1"/>
+          <p:cNvPr id="13" name="Picture Placeholder 3" descr="Image placeholder 3/3" title="Image placeholder 3/3"/>
+          <p:cNvSpPr>
+            <a:spLocks noGrp="1"/>
+          </p:cNvSpPr>
+          <p:nvPr>
+            <p:ph type="pic" sz="quarter" idx="14"/>
+          </p:nvPr>
+        </p:nvSpPr>
+        <p:spPr/>
+      </p:sp>
+      <p:sp>
+        <p:nvSpPr>
+          <p:cNvPr id="14" name="Text Placeholder column 2"/>
+          <p:cNvSpPr>
+            <a:spLocks noGrp="1"/>
+          </p:cNvSpPr>
+          <p:nvPr>
+            <p:ph type="body" sz="quarter" idx="15"/>
+          </p:nvPr>
+        </p:nvSpPr>
+        <p:spPr/>
+        <p:txBody>
+          <a:bodyPr/>
+          <a:lstStyle/>
+          <a:p>
+            <a:pPr lvl="0"/>
+            <a:r>
+              <a:rPr lang="en-US" dirty="0"/>
+              <a:t>First level</a:t>
+            </a:r>
+          </a:p>
+          <a:p>
+            <a:pPr lvl="1"/>
+            <a:r>
+              <a:rPr lang="en-US" dirty="0"/>
+              <a:t>Second level</a:t>
+            </a:r>
+          </a:p>
+        </p:txBody>
+      </p:sp>
+      <p:sp>
+        <p:nvSpPr>
+          <p:cNvPr id="15" name="Picture Placeholder 2" descr="Image placeholder 2/3" title="Image placeholder 2/3"/>
+          <p:cNvSpPr>
+            <a:spLocks noGrp="1"/>
+          </p:cNvSpPr>
+          <p:nvPr>
+            <p:ph type="pic" sz="quarter" idx="16"/>
+          </p:nvPr>
+        </p:nvSpPr>
+        <p:spPr/>
+      </p:sp>
+      <p:sp>
+        <p:nvSpPr>
+          <p:cNvPr id="10" name="Text Placeholder column 1"/>
           <p:cNvSpPr>
             <a:spLocks noGrp="1"/>
           </p:cNvSpPr>
@@ -9934,30 +10102,34 @@
           <a:p>
             <a:pPr lvl="0"/>
             <a:r>
-              <a:rPr lang="en-US"/>
+              <a:rPr lang="en-US" dirty="0"/>
               <a:t>First level</a:t>
             </a:r>
           </a:p>
           <a:p>
             <a:pPr lvl="1"/>
             <a:r>
-              <a:rPr lang="en-US"/>
+              <a:rPr lang="en-US" dirty="0"/>
               <a:t>Second level</a:t>
             </a:r>
           </a:p>
-          <a:p>
-            <a:pPr lvl="2"/>
-            <a:r>
-              <a:rPr lang="en-US"/>
-              <a:t>Third level</a:t>
-            </a:r>
-            <a:endParaRPr lang="en-US" dirty="0"/>
-          </a:p>
         </p:txBody>
       </p:sp>
       <p:sp>
         <p:nvSpPr>
-          <p:cNvPr id="7" name="Title"/>
+          <p:cNvPr id="11" name="Picture Placeholder 1" descr="Image placeholder 1/3" title="Image placeholder 1/3"/>
+          <p:cNvSpPr>
+            <a:spLocks noGrp="1"/>
+          </p:cNvSpPr>
+          <p:nvPr>
+            <p:ph type="pic" sz="quarter" idx="12"/>
+          </p:nvPr>
+        </p:nvSpPr>
+        <p:spPr/>
+      </p:sp>
+      <p:sp>
+        <p:nvSpPr>
+          <p:cNvPr id="2" name="Title"/>
           <p:cNvSpPr>
             <a:spLocks noGrp="1"/>
           </p:cNvSpPr>
@@ -9980,7 +10152,7 @@
     </p:spTree>
     <p:extLst>
       <p:ext uri="{BB962C8B-B14F-4D97-AF65-F5344CB8AC3E}">
-        <p14:creationId xmlns:p14="http://schemas.microsoft.com/office/powerpoint/2010/main" val="854015491"/>
+        <p14:creationId xmlns:p14="http://schemas.microsoft.com/office/powerpoint/2010/main" val="1175416068"/>
       </p:ext>
     </p:extLst>
   </p:cSld>
@@ -10009,7 +10181,7 @@
       </p:grpSpPr>
       <p:sp>
         <p:nvSpPr>
-          <p:cNvPr id="5" name="Text Placeholder column 3"/>
+          <p:cNvPr id="5" name="Text Placeholder column 4"/>
           <p:cNvSpPr>
             <a:spLocks noGrp="1"/>
           </p:cNvSpPr>
@@ -10024,35 +10196,39 @@
           <a:p>
             <a:pPr lvl="0"/>
             <a:r>
-              <a:rPr lang="en-US"/>
+              <a:rPr lang="en-US" dirty="0"/>
               <a:t>First level</a:t>
             </a:r>
           </a:p>
           <a:p>
             <a:pPr lvl="1"/>
             <a:r>
-              <a:rPr lang="en-US"/>
+              <a:rPr lang="en-US" dirty="0"/>
               <a:t>Second level</a:t>
             </a:r>
           </a:p>
-          <a:p>
-            <a:pPr lvl="2"/>
-            <a:r>
-              <a:rPr lang="en-US"/>
-              <a:t>Third level</a:t>
-            </a:r>
-            <a:endParaRPr lang="en-US" dirty="0"/>
-          </a:p>
         </p:txBody>
       </p:sp>
       <p:sp>
         <p:nvSpPr>
-          <p:cNvPr id="4" name="Text Placeholder column 2"/>
+          <p:cNvPr id="6" name="Picture Placeholder 4" descr="Image placeholder 4/4" title="Image placeholder 4/4"/>
           <p:cNvSpPr>
             <a:spLocks noGrp="1"/>
           </p:cNvSpPr>
           <p:nvPr>
-            <p:ph type="body" sz="quarter" idx="12"/>
+            <p:ph type="pic" sz="quarter" idx="14"/>
+          </p:nvPr>
+        </p:nvSpPr>
+        <p:spPr/>
+      </p:sp>
+      <p:sp>
+        <p:nvSpPr>
+          <p:cNvPr id="9" name="Text Placeholder column 3"/>
+          <p:cNvSpPr>
+            <a:spLocks noGrp="1"/>
+          </p:cNvSpPr>
+          <p:nvPr>
+            <p:ph type="body" sz="quarter" idx="17"/>
           </p:nvPr>
         </p:nvSpPr>
         <p:spPr/>
@@ -10062,26 +10238,72 @@
           <a:p>
             <a:pPr lvl="0"/>
             <a:r>
-              <a:rPr lang="en-US"/>
+              <a:rPr lang="en-US" dirty="0"/>
               <a:t>First level</a:t>
             </a:r>
           </a:p>
           <a:p>
             <a:pPr lvl="1"/>
             <a:r>
-              <a:rPr lang="en-US"/>
+              <a:rPr lang="en-US" dirty="0"/>
               <a:t>Second level</a:t>
             </a:r>
           </a:p>
-          <a:p>
-            <a:pPr lvl="2"/>
-            <a:r>
-              <a:rPr lang="en-US"/>
-              <a:t>Third level</a:t>
-            </a:r>
-            <a:endParaRPr lang="en-US" dirty="0"/>
-          </a:p>
         </p:txBody>
+      </p:sp>
+      <p:sp>
+        <p:nvSpPr>
+          <p:cNvPr id="10" name="Picture Placeholder 3" descr="Image placeholder 3/4" title="Image placeholder 3/4"/>
+          <p:cNvSpPr>
+            <a:spLocks noGrp="1"/>
+          </p:cNvSpPr>
+          <p:nvPr>
+            <p:ph type="pic" sz="quarter" idx="18"/>
+          </p:nvPr>
+        </p:nvSpPr>
+        <p:spPr/>
+      </p:sp>
+      <p:sp>
+        <p:nvSpPr>
+          <p:cNvPr id="7" name="Text Placeholder column 2"/>
+          <p:cNvSpPr>
+            <a:spLocks noGrp="1"/>
+          </p:cNvSpPr>
+          <p:nvPr>
+            <p:ph type="body" sz="quarter" idx="15"/>
+          </p:nvPr>
+        </p:nvSpPr>
+        <p:spPr/>
+        <p:txBody>
+          <a:bodyPr/>
+          <a:lstStyle/>
+          <a:p>
+            <a:pPr lvl="0"/>
+            <a:r>
+              <a:rPr lang="en-US" dirty="0"/>
+              <a:t>First level</a:t>
+            </a:r>
+          </a:p>
+          <a:p>
+            <a:pPr lvl="1"/>
+            <a:r>
+              <a:rPr lang="en-US" dirty="0"/>
+              <a:t>Second level</a:t>
+            </a:r>
+          </a:p>
+        </p:txBody>
+      </p:sp>
+      <p:sp>
+        <p:nvSpPr>
+          <p:cNvPr id="8" name="Picture Placeholder 2" descr="Image placeholder 2/4" title="Image placeholder 2/4"/>
+          <p:cNvSpPr>
+            <a:spLocks noGrp="1"/>
+          </p:cNvSpPr>
+          <p:nvPr>
+            <p:ph type="pic" sz="quarter" idx="16"/>
+          </p:nvPr>
+        </p:nvSpPr>
+        <p:spPr/>
       </p:sp>
       <p:sp>
         <p:nvSpPr>
@@ -10100,26 +10322,30 @@
           <a:p>
             <a:pPr lvl="0"/>
             <a:r>
-              <a:rPr lang="en-US"/>
+              <a:rPr lang="en-US" dirty="0"/>
               <a:t>First level</a:t>
             </a:r>
           </a:p>
           <a:p>
             <a:pPr lvl="1"/>
             <a:r>
-              <a:rPr lang="en-US"/>
+              <a:rPr lang="en-US" dirty="0"/>
               <a:t>Second level</a:t>
             </a:r>
           </a:p>
-          <a:p>
-            <a:pPr lvl="2"/>
-            <a:r>
-              <a:rPr lang="en-US"/>
-              <a:t>Third level</a:t>
-            </a:r>
-            <a:endParaRPr lang="en-US" dirty="0"/>
-          </a:p>
         </p:txBody>
+      </p:sp>
+      <p:sp>
+        <p:nvSpPr>
+          <p:cNvPr id="4" name="Picture Placeholder 1" descr="Image placeholder 1/4" title="Image placeholder 1/4"/>
+          <p:cNvSpPr>
+            <a:spLocks noGrp="1"/>
+          </p:cNvSpPr>
+          <p:nvPr>
+            <p:ph type="pic" sz="quarter" idx="12"/>
+          </p:nvPr>
+        </p:nvSpPr>
+        <p:spPr/>
       </p:sp>
       <p:sp>
         <p:nvSpPr>
@@ -10146,7 +10372,7 @@
     </p:spTree>
     <p:extLst>
       <p:ext uri="{BB962C8B-B14F-4D97-AF65-F5344CB8AC3E}">
-        <p14:creationId xmlns:p14="http://schemas.microsoft.com/office/powerpoint/2010/main" val="94846162"/>
+        <p14:creationId xmlns:p14="http://schemas.microsoft.com/office/powerpoint/2010/main" val="3242553429"/>
       </p:ext>
     </p:extLst>
   </p:cSld>
@@ -10175,540 +10401,6 @@
       </p:grpSpPr>
       <p:sp>
         <p:nvSpPr>
-          <p:cNvPr id="10" name="Text Placeholder column 2"/>
-          <p:cNvSpPr>
-            <a:spLocks noGrp="1"/>
-          </p:cNvSpPr>
-          <p:nvPr>
-            <p:ph type="body" sz="quarter" idx="13"/>
-          </p:nvPr>
-        </p:nvSpPr>
-        <p:spPr/>
-        <p:txBody>
-          <a:bodyPr/>
-          <a:lstStyle/>
-          <a:p>
-            <a:pPr lvl="0"/>
-            <a:r>
-              <a:rPr lang="en-US" dirty="0"/>
-              <a:t>First level</a:t>
-            </a:r>
-          </a:p>
-          <a:p>
-            <a:pPr lvl="1"/>
-            <a:r>
-              <a:rPr lang="en-US" dirty="0"/>
-              <a:t>Second level</a:t>
-            </a:r>
-          </a:p>
-        </p:txBody>
-      </p:sp>
-      <p:sp>
-        <p:nvSpPr>
-          <p:cNvPr id="16" name="Picture Placeholder 2" descr="Image placeholder right" title="Image placeholder"/>
-          <p:cNvSpPr>
-            <a:spLocks noGrp="1"/>
-          </p:cNvSpPr>
-          <p:nvPr>
-            <p:ph type="pic" sz="quarter" idx="14"/>
-          </p:nvPr>
-        </p:nvSpPr>
-        <p:spPr/>
-      </p:sp>
-      <p:sp>
-        <p:nvSpPr>
-          <p:cNvPr id="3" name="Text Placeholder column 1"/>
-          <p:cNvSpPr>
-            <a:spLocks noGrp="1"/>
-          </p:cNvSpPr>
-          <p:nvPr>
-            <p:ph type="body" sz="quarter" idx="10"/>
-          </p:nvPr>
-        </p:nvSpPr>
-        <p:spPr/>
-        <p:txBody>
-          <a:bodyPr/>
-          <a:lstStyle/>
-          <a:p>
-            <a:pPr lvl="0"/>
-            <a:r>
-              <a:rPr lang="en-US" dirty="0"/>
-              <a:t>First level</a:t>
-            </a:r>
-          </a:p>
-          <a:p>
-            <a:pPr lvl="1"/>
-            <a:r>
-              <a:rPr lang="en-US" dirty="0"/>
-              <a:t>Second level</a:t>
-            </a:r>
-          </a:p>
-        </p:txBody>
-      </p:sp>
-      <p:sp>
-        <p:nvSpPr>
-          <p:cNvPr id="15" name="Picture Placeholder 1" descr="Image placeholder left" title="Image placeholde"/>
-          <p:cNvSpPr>
-            <a:spLocks noGrp="1"/>
-          </p:cNvSpPr>
-          <p:nvPr>
-            <p:ph type="pic" sz="quarter" idx="12"/>
-          </p:nvPr>
-        </p:nvSpPr>
-        <p:spPr/>
-      </p:sp>
-      <p:sp>
-        <p:nvSpPr>
-          <p:cNvPr id="8" name="Title"/>
-          <p:cNvSpPr>
-            <a:spLocks noGrp="1"/>
-          </p:cNvSpPr>
-          <p:nvPr>
-            <p:ph type="title"/>
-          </p:nvPr>
-        </p:nvSpPr>
-        <p:spPr/>
-        <p:txBody>
-          <a:bodyPr/>
-          <a:lstStyle/>
-          <a:p>
-            <a:r>
-              <a:rPr lang="en-US" dirty="0"/>
-              <a:t>Insert page title (sentence case)</a:t>
-            </a:r>
-          </a:p>
-        </p:txBody>
-      </p:sp>
-    </p:spTree>
-    <p:extLst>
-      <p:ext uri="{BB962C8B-B14F-4D97-AF65-F5344CB8AC3E}">
-        <p14:creationId xmlns:p14="http://schemas.microsoft.com/office/powerpoint/2010/main" val="1504049518"/>
-      </p:ext>
-    </p:extLst>
-  </p:cSld>
-  <p:clrMapOvr>
-    <a:masterClrMapping/>
-  </p:clrMapOvr>
-</p:sld>
-</file>
-
-<file path=ppt/slides/slide16.xml><?xml version="1.0" encoding="utf-8"?>
-<p:sld xmlns:a="http://schemas.openxmlformats.org/drawingml/2006/main" xmlns:r="http://schemas.openxmlformats.org/officeDocument/2006/relationships" xmlns:p="http://schemas.openxmlformats.org/presentationml/2006/main">
-  <p:cSld>
-    <p:spTree>
-      <p:nvGrpSpPr>
-        <p:cNvPr id="1" name=""/>
-        <p:cNvGrpSpPr/>
-        <p:nvPr/>
-      </p:nvGrpSpPr>
-      <p:grpSpPr>
-        <a:xfrm>
-          <a:off x="0" y="0"/>
-          <a:ext cx="0" cy="0"/>
-          <a:chOff x="0" y="0"/>
-          <a:chExt cx="0" cy="0"/>
-        </a:xfrm>
-      </p:grpSpPr>
-      <p:sp>
-        <p:nvSpPr>
-          <p:cNvPr id="12" name="Text Placeholder column 3"/>
-          <p:cNvSpPr>
-            <a:spLocks noGrp="1"/>
-          </p:cNvSpPr>
-          <p:nvPr>
-            <p:ph type="body" sz="quarter" idx="13"/>
-          </p:nvPr>
-        </p:nvSpPr>
-        <p:spPr/>
-        <p:txBody>
-          <a:bodyPr/>
-          <a:lstStyle/>
-          <a:p>
-            <a:pPr lvl="0"/>
-            <a:r>
-              <a:rPr lang="en-US" dirty="0"/>
-              <a:t>First level</a:t>
-            </a:r>
-          </a:p>
-          <a:p>
-            <a:pPr lvl="1"/>
-            <a:r>
-              <a:rPr lang="en-US" dirty="0"/>
-              <a:t>Second level</a:t>
-            </a:r>
-          </a:p>
-        </p:txBody>
-      </p:sp>
-      <p:sp>
-        <p:nvSpPr>
-          <p:cNvPr id="13" name="Picture Placeholder 3" descr="Image placeholder 3/3" title="Image placeholder 3/3"/>
-          <p:cNvSpPr>
-            <a:spLocks noGrp="1"/>
-          </p:cNvSpPr>
-          <p:nvPr>
-            <p:ph type="pic" sz="quarter" idx="14"/>
-          </p:nvPr>
-        </p:nvSpPr>
-        <p:spPr/>
-      </p:sp>
-      <p:sp>
-        <p:nvSpPr>
-          <p:cNvPr id="14" name="Text Placeholder column 2"/>
-          <p:cNvSpPr>
-            <a:spLocks noGrp="1"/>
-          </p:cNvSpPr>
-          <p:nvPr>
-            <p:ph type="body" sz="quarter" idx="15"/>
-          </p:nvPr>
-        </p:nvSpPr>
-        <p:spPr/>
-        <p:txBody>
-          <a:bodyPr/>
-          <a:lstStyle/>
-          <a:p>
-            <a:pPr lvl="0"/>
-            <a:r>
-              <a:rPr lang="en-US" dirty="0"/>
-              <a:t>First level</a:t>
-            </a:r>
-          </a:p>
-          <a:p>
-            <a:pPr lvl="1"/>
-            <a:r>
-              <a:rPr lang="en-US" dirty="0"/>
-              <a:t>Second level</a:t>
-            </a:r>
-          </a:p>
-        </p:txBody>
-      </p:sp>
-      <p:sp>
-        <p:nvSpPr>
-          <p:cNvPr id="15" name="Picture Placeholder 2" descr="Image placeholder 2/3" title="Image placeholder 2/3"/>
-          <p:cNvSpPr>
-            <a:spLocks noGrp="1"/>
-          </p:cNvSpPr>
-          <p:nvPr>
-            <p:ph type="pic" sz="quarter" idx="16"/>
-          </p:nvPr>
-        </p:nvSpPr>
-        <p:spPr/>
-      </p:sp>
-      <p:sp>
-        <p:nvSpPr>
-          <p:cNvPr id="10" name="Text Placeholder column 1"/>
-          <p:cNvSpPr>
-            <a:spLocks noGrp="1"/>
-          </p:cNvSpPr>
-          <p:nvPr>
-            <p:ph type="body" sz="quarter" idx="10"/>
-          </p:nvPr>
-        </p:nvSpPr>
-        <p:spPr/>
-        <p:txBody>
-          <a:bodyPr/>
-          <a:lstStyle/>
-          <a:p>
-            <a:pPr lvl="0"/>
-            <a:r>
-              <a:rPr lang="en-US" dirty="0"/>
-              <a:t>First level</a:t>
-            </a:r>
-          </a:p>
-          <a:p>
-            <a:pPr lvl="1"/>
-            <a:r>
-              <a:rPr lang="en-US" dirty="0"/>
-              <a:t>Second level</a:t>
-            </a:r>
-          </a:p>
-        </p:txBody>
-      </p:sp>
-      <p:sp>
-        <p:nvSpPr>
-          <p:cNvPr id="11" name="Picture Placeholder 1" descr="Image placeholder 1/3" title="Image placeholder 1/3"/>
-          <p:cNvSpPr>
-            <a:spLocks noGrp="1"/>
-          </p:cNvSpPr>
-          <p:nvPr>
-            <p:ph type="pic" sz="quarter" idx="12"/>
-          </p:nvPr>
-        </p:nvSpPr>
-        <p:spPr/>
-      </p:sp>
-      <p:sp>
-        <p:nvSpPr>
-          <p:cNvPr id="2" name="Title"/>
-          <p:cNvSpPr>
-            <a:spLocks noGrp="1"/>
-          </p:cNvSpPr>
-          <p:nvPr>
-            <p:ph type="title"/>
-          </p:nvPr>
-        </p:nvSpPr>
-        <p:spPr/>
-        <p:txBody>
-          <a:bodyPr/>
-          <a:lstStyle/>
-          <a:p>
-            <a:r>
-              <a:rPr lang="en-US" dirty="0"/>
-              <a:t>Insert page title (sentence case)</a:t>
-            </a:r>
-          </a:p>
-        </p:txBody>
-      </p:sp>
-    </p:spTree>
-    <p:extLst>
-      <p:ext uri="{BB962C8B-B14F-4D97-AF65-F5344CB8AC3E}">
-        <p14:creationId xmlns:p14="http://schemas.microsoft.com/office/powerpoint/2010/main" val="1175416068"/>
-      </p:ext>
-    </p:extLst>
-  </p:cSld>
-  <p:clrMapOvr>
-    <a:masterClrMapping/>
-  </p:clrMapOvr>
-</p:sld>
-</file>
-
-<file path=ppt/slides/slide17.xml><?xml version="1.0" encoding="utf-8"?>
-<p:sld xmlns:a="http://schemas.openxmlformats.org/drawingml/2006/main" xmlns:r="http://schemas.openxmlformats.org/officeDocument/2006/relationships" xmlns:p="http://schemas.openxmlformats.org/presentationml/2006/main">
-  <p:cSld>
-    <p:spTree>
-      <p:nvGrpSpPr>
-        <p:cNvPr id="1" name=""/>
-        <p:cNvGrpSpPr/>
-        <p:nvPr/>
-      </p:nvGrpSpPr>
-      <p:grpSpPr>
-        <a:xfrm>
-          <a:off x="0" y="0"/>
-          <a:ext cx="0" cy="0"/>
-          <a:chOff x="0" y="0"/>
-          <a:chExt cx="0" cy="0"/>
-        </a:xfrm>
-      </p:grpSpPr>
-      <p:sp>
-        <p:nvSpPr>
-          <p:cNvPr id="5" name="Text Placeholder column 4"/>
-          <p:cNvSpPr>
-            <a:spLocks noGrp="1"/>
-          </p:cNvSpPr>
-          <p:nvPr>
-            <p:ph type="body" sz="quarter" idx="13"/>
-          </p:nvPr>
-        </p:nvSpPr>
-        <p:spPr/>
-        <p:txBody>
-          <a:bodyPr/>
-          <a:lstStyle/>
-          <a:p>
-            <a:pPr lvl="0"/>
-            <a:r>
-              <a:rPr lang="en-US" dirty="0"/>
-              <a:t>First level</a:t>
-            </a:r>
-          </a:p>
-          <a:p>
-            <a:pPr lvl="1"/>
-            <a:r>
-              <a:rPr lang="en-US" dirty="0"/>
-              <a:t>Second level</a:t>
-            </a:r>
-          </a:p>
-        </p:txBody>
-      </p:sp>
-      <p:sp>
-        <p:nvSpPr>
-          <p:cNvPr id="6" name="Picture Placeholder 4" descr="Image placeholder 4/4" title="Image placeholder 4/4"/>
-          <p:cNvSpPr>
-            <a:spLocks noGrp="1"/>
-          </p:cNvSpPr>
-          <p:nvPr>
-            <p:ph type="pic" sz="quarter" idx="14"/>
-          </p:nvPr>
-        </p:nvSpPr>
-        <p:spPr/>
-      </p:sp>
-      <p:sp>
-        <p:nvSpPr>
-          <p:cNvPr id="9" name="Text Placeholder column 3"/>
-          <p:cNvSpPr>
-            <a:spLocks noGrp="1"/>
-          </p:cNvSpPr>
-          <p:nvPr>
-            <p:ph type="body" sz="quarter" idx="17"/>
-          </p:nvPr>
-        </p:nvSpPr>
-        <p:spPr/>
-        <p:txBody>
-          <a:bodyPr/>
-          <a:lstStyle/>
-          <a:p>
-            <a:pPr lvl="0"/>
-            <a:r>
-              <a:rPr lang="en-US" dirty="0"/>
-              <a:t>First level</a:t>
-            </a:r>
-          </a:p>
-          <a:p>
-            <a:pPr lvl="1"/>
-            <a:r>
-              <a:rPr lang="en-US" dirty="0"/>
-              <a:t>Second level</a:t>
-            </a:r>
-          </a:p>
-        </p:txBody>
-      </p:sp>
-      <p:sp>
-        <p:nvSpPr>
-          <p:cNvPr id="10" name="Picture Placeholder 3" descr="Image placeholder 3/4" title="Image placeholder 3/4"/>
-          <p:cNvSpPr>
-            <a:spLocks noGrp="1"/>
-          </p:cNvSpPr>
-          <p:nvPr>
-            <p:ph type="pic" sz="quarter" idx="18"/>
-          </p:nvPr>
-        </p:nvSpPr>
-        <p:spPr/>
-      </p:sp>
-      <p:sp>
-        <p:nvSpPr>
-          <p:cNvPr id="7" name="Text Placeholder column 2"/>
-          <p:cNvSpPr>
-            <a:spLocks noGrp="1"/>
-          </p:cNvSpPr>
-          <p:nvPr>
-            <p:ph type="body" sz="quarter" idx="15"/>
-          </p:nvPr>
-        </p:nvSpPr>
-        <p:spPr/>
-        <p:txBody>
-          <a:bodyPr/>
-          <a:lstStyle/>
-          <a:p>
-            <a:pPr lvl="0"/>
-            <a:r>
-              <a:rPr lang="en-US" dirty="0"/>
-              <a:t>First level</a:t>
-            </a:r>
-          </a:p>
-          <a:p>
-            <a:pPr lvl="1"/>
-            <a:r>
-              <a:rPr lang="en-US" dirty="0"/>
-              <a:t>Second level</a:t>
-            </a:r>
-          </a:p>
-        </p:txBody>
-      </p:sp>
-      <p:sp>
-        <p:nvSpPr>
-          <p:cNvPr id="8" name="Picture Placeholder 2" descr="Image placeholder 2/4" title="Image placeholder 2/4"/>
-          <p:cNvSpPr>
-            <a:spLocks noGrp="1"/>
-          </p:cNvSpPr>
-          <p:nvPr>
-            <p:ph type="pic" sz="quarter" idx="16"/>
-          </p:nvPr>
-        </p:nvSpPr>
-        <p:spPr/>
-      </p:sp>
-      <p:sp>
-        <p:nvSpPr>
-          <p:cNvPr id="3" name="Text Placeholder column 1"/>
-          <p:cNvSpPr>
-            <a:spLocks noGrp="1"/>
-          </p:cNvSpPr>
-          <p:nvPr>
-            <p:ph type="body" sz="quarter" idx="10"/>
-          </p:nvPr>
-        </p:nvSpPr>
-        <p:spPr/>
-        <p:txBody>
-          <a:bodyPr/>
-          <a:lstStyle/>
-          <a:p>
-            <a:pPr lvl="0"/>
-            <a:r>
-              <a:rPr lang="en-US" dirty="0"/>
-              <a:t>First level</a:t>
-            </a:r>
-          </a:p>
-          <a:p>
-            <a:pPr lvl="1"/>
-            <a:r>
-              <a:rPr lang="en-US" dirty="0"/>
-              <a:t>Second level</a:t>
-            </a:r>
-          </a:p>
-        </p:txBody>
-      </p:sp>
-      <p:sp>
-        <p:nvSpPr>
-          <p:cNvPr id="4" name="Picture Placeholder 1" descr="Image placeholder 1/4" title="Image placeholder 1/4"/>
-          <p:cNvSpPr>
-            <a:spLocks noGrp="1"/>
-          </p:cNvSpPr>
-          <p:nvPr>
-            <p:ph type="pic" sz="quarter" idx="12"/>
-          </p:nvPr>
-        </p:nvSpPr>
-        <p:spPr/>
-      </p:sp>
-      <p:sp>
-        <p:nvSpPr>
-          <p:cNvPr id="2" name="Title"/>
-          <p:cNvSpPr>
-            <a:spLocks noGrp="1"/>
-          </p:cNvSpPr>
-          <p:nvPr>
-            <p:ph type="title"/>
-          </p:nvPr>
-        </p:nvSpPr>
-        <p:spPr/>
-        <p:txBody>
-          <a:bodyPr/>
-          <a:lstStyle/>
-          <a:p>
-            <a:r>
-              <a:rPr lang="en-US" dirty="0"/>
-              <a:t>Insert page title (sentence case)</a:t>
-            </a:r>
-          </a:p>
-        </p:txBody>
-      </p:sp>
-    </p:spTree>
-    <p:extLst>
-      <p:ext uri="{BB962C8B-B14F-4D97-AF65-F5344CB8AC3E}">
-        <p14:creationId xmlns:p14="http://schemas.microsoft.com/office/powerpoint/2010/main" val="3242553429"/>
-      </p:ext>
-    </p:extLst>
-  </p:cSld>
-  <p:clrMapOvr>
-    <a:masterClrMapping/>
-  </p:clrMapOvr>
-</p:sld>
-</file>
-
-<file path=ppt/slides/slide18.xml><?xml version="1.0" encoding="utf-8"?>
-<p:sld xmlns:a="http://schemas.openxmlformats.org/drawingml/2006/main" xmlns:r="http://schemas.openxmlformats.org/officeDocument/2006/relationships" xmlns:p="http://schemas.openxmlformats.org/presentationml/2006/main">
-  <p:cSld>
-    <p:spTree>
-      <p:nvGrpSpPr>
-        <p:cNvPr id="1" name=""/>
-        <p:cNvGrpSpPr/>
-        <p:nvPr/>
-      </p:nvGrpSpPr>
-      <p:grpSpPr>
-        <a:xfrm>
-          <a:off x="0" y="0"/>
-          <a:ext cx="0" cy="0"/>
-          <a:chOff x="0" y="0"/>
-          <a:chExt cx="0" cy="0"/>
-        </a:xfrm>
-      </p:grpSpPr>
-      <p:sp>
-        <p:nvSpPr>
           <p:cNvPr id="4" name="Placeholder Partner logo"/>
           <p:cNvSpPr/>
           <p:nvPr/>
@@ -10825,7 +10517,7 @@
 </p:sld>
 </file>
 
-<file path=ppt/slides/slide19.xml><?xml version="1.0" encoding="utf-8"?>
+<file path=ppt/slides/slide16.xml><?xml version="1.0" encoding="utf-8"?>
 <p:sld xmlns:a="http://schemas.openxmlformats.org/drawingml/2006/main" xmlns:r="http://schemas.openxmlformats.org/officeDocument/2006/relationships" xmlns:p="http://schemas.openxmlformats.org/presentationml/2006/main" show="0">
   <p:cSld>
     <p:spTree>
@@ -10851,123 +10543,7 @@
 </p:sld>
 </file>
 
-<file path=ppt/slides/slide2.xml><?xml version="1.0" encoding="utf-8"?>
-<p:sld xmlns:a="http://schemas.openxmlformats.org/drawingml/2006/main" xmlns:r="http://schemas.openxmlformats.org/officeDocument/2006/relationships" xmlns:p="http://schemas.openxmlformats.org/presentationml/2006/main">
-  <p:cSld>
-    <p:spTree>
-      <p:nvGrpSpPr>
-        <p:cNvPr id="1" name=""/>
-        <p:cNvGrpSpPr/>
-        <p:nvPr/>
-      </p:nvGrpSpPr>
-      <p:grpSpPr>
-        <a:xfrm>
-          <a:off x="0" y="0"/>
-          <a:ext cx="0" cy="0"/>
-          <a:chOff x="0" y="0"/>
-          <a:chExt cx="0" cy="0"/>
-        </a:xfrm>
-      </p:grpSpPr>
-      <p:sp>
-        <p:nvSpPr>
-          <p:cNvPr id="3" name="Agenda items"/>
-          <p:cNvSpPr>
-            <a:spLocks noGrp="1"/>
-          </p:cNvSpPr>
-          <p:nvPr>
-            <p:ph type="body" sz="quarter" idx="10"/>
-          </p:nvPr>
-        </p:nvSpPr>
-        <p:spPr/>
-        <p:txBody>
-          <a:bodyPr/>
-          <a:lstStyle/>
-          <a:p>
-            <a:r>
-              <a:rPr lang="en-US" dirty="0"/>
-              <a:t>Evolution of deployment mechanisms</a:t>
-            </a:r>
-          </a:p>
-          <a:p>
-            <a:pPr lvl="1"/>
-            <a:r>
-              <a:rPr lang="en-US" dirty="0"/>
-              <a:t>From servers to containers</a:t>
-            </a:r>
-          </a:p>
-          <a:p>
-            <a:pPr lvl="1"/>
-            <a:r>
-              <a:rPr lang="en-US" dirty="0"/>
-              <a:t>From containers, where?</a:t>
-            </a:r>
-          </a:p>
-          <a:p>
-            <a:r>
-              <a:rPr lang="en-US" dirty="0"/>
-              <a:t>Kubernetes automatization</a:t>
-            </a:r>
-          </a:p>
-          <a:p>
-            <a:pPr lvl="1"/>
-            <a:r>
-              <a:rPr lang="en-US" dirty="0"/>
-              <a:t>Smarter deployments</a:t>
-            </a:r>
-          </a:p>
-          <a:p>
-            <a:pPr lvl="1"/>
-            <a:r>
-              <a:rPr lang="en-US" dirty="0"/>
-              <a:t>Autoscaling</a:t>
-            </a:r>
-          </a:p>
-          <a:p>
-            <a:r>
-              <a:rPr lang="en-US" dirty="0"/>
-              <a:t>Helm – deploying simple</a:t>
-            </a:r>
-          </a:p>
-          <a:p>
-            <a:pPr lvl="1"/>
-            <a:r>
-              <a:rPr lang="en-US" dirty="0"/>
-              <a:t>How to automate the automat?</a:t>
-            </a:r>
-          </a:p>
-        </p:txBody>
-      </p:sp>
-      <p:sp>
-        <p:nvSpPr>
-          <p:cNvPr id="2" name="Agenda"/>
-          <p:cNvSpPr>
-            <a:spLocks noGrp="1"/>
-          </p:cNvSpPr>
-          <p:nvPr>
-            <p:ph type="title"/>
-          </p:nvPr>
-        </p:nvSpPr>
-        <p:spPr/>
-        <p:txBody>
-          <a:bodyPr/>
-          <a:lstStyle/>
-          <a:p>
-            <a:r>
-              <a:rPr lang="en-US" dirty="0"/>
-              <a:t>Agenda</a:t>
-            </a:r>
-          </a:p>
-        </p:txBody>
-      </p:sp>
-    </p:spTree>
-  </p:cSld>
-  <p:clrMapOvr>
-    <a:masterClrMapping/>
-  </p:clrMapOvr>
-</p:sld>
-</file>
-
-<file path=ppt/slides/slide20.xml><?xml version="1.0" encoding="utf-8"?>
+<file path=ppt/slides/slide17.xml><?xml version="1.0" encoding="utf-8"?>
 <p:sld xmlns:a="http://schemas.openxmlformats.org/drawingml/2006/main" xmlns:r="http://schemas.openxmlformats.org/officeDocument/2006/relationships" xmlns:p="http://schemas.openxmlformats.org/presentationml/2006/main" show="0">
   <p:cSld>
     <p:spTree>
@@ -10997,6 +10573,122 @@
 </p:sld>
 </file>
 
+<file path=ppt/slides/slide2.xml><?xml version="1.0" encoding="utf-8"?>
+<p:sld xmlns:a="http://schemas.openxmlformats.org/drawingml/2006/main" xmlns:r="http://schemas.openxmlformats.org/officeDocument/2006/relationships" xmlns:p="http://schemas.openxmlformats.org/presentationml/2006/main">
+  <p:cSld>
+    <p:spTree>
+      <p:nvGrpSpPr>
+        <p:cNvPr id="1" name=""/>
+        <p:cNvGrpSpPr/>
+        <p:nvPr/>
+      </p:nvGrpSpPr>
+      <p:grpSpPr>
+        <a:xfrm>
+          <a:off x="0" y="0"/>
+          <a:ext cx="0" cy="0"/>
+          <a:chOff x="0" y="0"/>
+          <a:chExt cx="0" cy="0"/>
+        </a:xfrm>
+      </p:grpSpPr>
+      <p:sp>
+        <p:nvSpPr>
+          <p:cNvPr id="3" name="Agenda items"/>
+          <p:cNvSpPr>
+            <a:spLocks noGrp="1"/>
+          </p:cNvSpPr>
+          <p:nvPr>
+            <p:ph type="body" sz="quarter" idx="10"/>
+          </p:nvPr>
+        </p:nvSpPr>
+        <p:spPr/>
+        <p:txBody>
+          <a:bodyPr/>
+          <a:lstStyle/>
+          <a:p>
+            <a:r>
+              <a:rPr lang="en-US" dirty="0"/>
+              <a:t>Evolution of deployment mechanisms</a:t>
+            </a:r>
+          </a:p>
+          <a:p>
+            <a:pPr lvl="1"/>
+            <a:r>
+              <a:rPr lang="en-US" dirty="0"/>
+              <a:t>From servers to containers</a:t>
+            </a:r>
+          </a:p>
+          <a:p>
+            <a:pPr lvl="1"/>
+            <a:r>
+              <a:rPr lang="en-US" dirty="0"/>
+              <a:t>From containers, where?</a:t>
+            </a:r>
+          </a:p>
+          <a:p>
+            <a:r>
+              <a:rPr lang="en-US" dirty="0"/>
+              <a:t>Kubernetes automatization</a:t>
+            </a:r>
+          </a:p>
+          <a:p>
+            <a:pPr lvl="1"/>
+            <a:r>
+              <a:rPr lang="en-US" dirty="0"/>
+              <a:t>Smarter deployments</a:t>
+            </a:r>
+          </a:p>
+          <a:p>
+            <a:pPr lvl="1"/>
+            <a:r>
+              <a:rPr lang="en-US" dirty="0"/>
+              <a:t>Autoscaling</a:t>
+            </a:r>
+          </a:p>
+          <a:p>
+            <a:r>
+              <a:rPr lang="en-US" dirty="0"/>
+              <a:t>Helm – deploying simple</a:t>
+            </a:r>
+          </a:p>
+          <a:p>
+            <a:pPr lvl="1"/>
+            <a:r>
+              <a:rPr lang="en-US" dirty="0"/>
+              <a:t>How to automate the automat?</a:t>
+            </a:r>
+          </a:p>
+        </p:txBody>
+      </p:sp>
+      <p:sp>
+        <p:nvSpPr>
+          <p:cNvPr id="2" name="Agenda"/>
+          <p:cNvSpPr>
+            <a:spLocks noGrp="1"/>
+          </p:cNvSpPr>
+          <p:nvPr>
+            <p:ph type="title"/>
+          </p:nvPr>
+        </p:nvSpPr>
+        <p:spPr/>
+        <p:txBody>
+          <a:bodyPr/>
+          <a:lstStyle/>
+          <a:p>
+            <a:r>
+              <a:rPr lang="en-US" dirty="0"/>
+              <a:t>Agenda</a:t>
+            </a:r>
+          </a:p>
+        </p:txBody>
+      </p:sp>
+    </p:spTree>
+  </p:cSld>
+  <p:clrMapOvr>
+    <a:masterClrMapping/>
+  </p:clrMapOvr>
+</p:sld>
+</file>
+
 <file path=ppt/slides/slide3.xml><?xml version="1.0" encoding="utf-8"?>
 <p:sld xmlns:a="http://schemas.openxmlformats.org/drawingml/2006/main" xmlns:r="http://schemas.openxmlformats.org/officeDocument/2006/relationships" xmlns:p="http://schemas.openxmlformats.org/presentationml/2006/main">
   <p:cSld>
@@ -11016,7 +10708,7 @@
       </p:grpSpPr>
       <p:sp>
         <p:nvSpPr>
-          <p:cNvPr id="2" name="Divider"/>
+          <p:cNvPr id="3" name="Divider"/>
           <p:cNvSpPr>
             <a:spLocks noGrp="1"/>
           </p:cNvSpPr>
@@ -11041,13 +10733,44 @@
               </a:rPr>
               <a:t>page</a:t>
             </a:r>
+            <a:endParaRPr lang="en-US" dirty="0"/>
           </a:p>
         </p:txBody>
       </p:sp>
+      <p:pic>
+        <p:nvPicPr>
+          <p:cNvPr id="6" name="Illustration" descr="Example of an illustration " title="Illustration for divider page"/>
+          <p:cNvPicPr>
+            <a:picLocks noGrp="1" noChangeAspect="1"/>
+          </p:cNvPicPr>
+          <p:nvPr>
+            <p:ph type="pic" sz="quarter" idx="12"/>
+          </p:nvPr>
+        </p:nvPicPr>
+        <p:blipFill>
+          <a:blip r:embed="rId2">
+            <a:extLst>
+              <a:ext uri="{28A0092B-C50C-407E-A947-70E740481C1C}">
+                <a14:useLocalDpi xmlns:a14="http://schemas.microsoft.com/office/drawing/2010/main"/>
+              </a:ext>
+            </a:extLst>
+          </a:blip>
+          <a:srcRect t="3112" b="3112"/>
+          <a:stretch>
+            <a:fillRect/>
+          </a:stretch>
+        </p:blipFill>
+        <p:spPr bwMode="invGray">
+          <a:xfrm>
+            <a:off x="0" y="3427200"/>
+            <a:ext cx="12195175" cy="3430800"/>
+          </a:xfrm>
+        </p:spPr>
+      </p:pic>
     </p:spTree>
     <p:extLst>
       <p:ext uri="{BB962C8B-B14F-4D97-AF65-F5344CB8AC3E}">
-        <p14:creationId xmlns:p14="http://schemas.microsoft.com/office/powerpoint/2010/main" val="799205039"/>
+        <p14:creationId xmlns:p14="http://schemas.microsoft.com/office/powerpoint/2010/main" val="1515423877"/>
       </p:ext>
     </p:extLst>
   </p:cSld>
@@ -11076,63 +10799,35 @@
       </p:grpSpPr>
       <p:sp>
         <p:nvSpPr>
-          <p:cNvPr id="3" name="Divider"/>
+          <p:cNvPr id="24" name="Title"/>
           <p:cNvSpPr>
             <a:spLocks noGrp="1"/>
           </p:cNvSpPr>
           <p:nvPr>
-            <p:ph type="ctrTitle"/>
+            <p:ph type="title"/>
           </p:nvPr>
         </p:nvSpPr>
-        <p:spPr/>
+        <p:spPr>
+          <a:xfrm>
+            <a:off x="504001" y="504000"/>
+            <a:ext cx="11186476" cy="369332"/>
+          </a:xfrm>
+        </p:spPr>
         <p:txBody>
           <a:bodyPr/>
           <a:lstStyle/>
           <a:p>
             <a:r>
               <a:rPr lang="en-US" dirty="0"/>
-              <a:t>Divider </a:t>
-            </a:r>
-            <a:r>
-              <a:rPr lang="en-US" dirty="0">
-                <a:solidFill>
-                  <a:schemeClr val="accent1"/>
-                </a:solidFill>
-              </a:rPr>
-              <a:t>page</a:t>
-            </a:r>
-            <a:endParaRPr lang="en-US" dirty="0"/>
+              <a:t>Info - Adam</a:t>
+            </a:r>
           </a:p>
         </p:txBody>
       </p:sp>
-      <p:pic>
-        <p:nvPicPr>
-          <p:cNvPr id="6" name="Illustration" descr="Example of an illustration " title="Illustration for divider page"/>
-          <p:cNvPicPr>
-            <a:picLocks noGrp="1" noChangeAspect="1"/>
-          </p:cNvPicPr>
-          <p:nvPr>
-            <p:ph type="pic" sz="quarter" idx="12"/>
-          </p:nvPr>
-        </p:nvPicPr>
-        <p:blipFill>
-          <a:blip r:embed="rId2"/>
-          <a:srcRect t="3112" b="3112"/>
-          <a:stretch>
-            <a:fillRect/>
-          </a:stretch>
-        </p:blipFill>
-        <p:spPr bwMode="invGray">
-          <a:xfrm>
-            <a:off x="0" y="3427200"/>
-            <a:ext cx="12195175" cy="3430800"/>
-          </a:xfrm>
-        </p:spPr>
-      </p:pic>
     </p:spTree>
     <p:extLst>
       <p:ext uri="{BB962C8B-B14F-4D97-AF65-F5344CB8AC3E}">
-        <p14:creationId xmlns:p14="http://schemas.microsoft.com/office/powerpoint/2010/main" val="1515423877"/>
+        <p14:creationId xmlns:p14="http://schemas.microsoft.com/office/powerpoint/2010/main" val="3602749482"/>
       </p:ext>
     </p:extLst>
   </p:cSld>
@@ -11161,35 +10856,68 @@
       </p:grpSpPr>
       <p:sp>
         <p:nvSpPr>
-          <p:cNvPr id="24" name="Title"/>
+          <p:cNvPr id="3" name="Divider"/>
           <p:cNvSpPr>
             <a:spLocks noGrp="1"/>
           </p:cNvSpPr>
           <p:nvPr>
-            <p:ph type="title"/>
+            <p:ph type="ctrTitle"/>
           </p:nvPr>
         </p:nvSpPr>
-        <p:spPr>
-          <a:xfrm>
-            <a:off x="504001" y="504000"/>
-            <a:ext cx="11186476" cy="369332"/>
-          </a:xfrm>
-        </p:spPr>
+        <p:spPr/>
         <p:txBody>
           <a:bodyPr/>
           <a:lstStyle/>
           <a:p>
             <a:r>
-              <a:rPr lang="en-US" dirty="0"/>
-              <a:t>Insert page title (sentence case)</a:t>
+              <a:rPr lang="en-US" dirty="0">
+                <a:solidFill>
+                  <a:schemeClr val="accent1"/>
+                </a:solidFill>
+              </a:rPr>
+              <a:t>Smarter</a:t>
+            </a:r>
+            <a:r>
+              <a:rPr lang="en-US" dirty="0"/>
+              <a:t> deployments in Kubernetes</a:t>
             </a:r>
           </a:p>
         </p:txBody>
       </p:sp>
+      <p:pic>
+        <p:nvPicPr>
+          <p:cNvPr id="6" name="Illustration" descr="Example of an illustration " title="Illustration for divider page"/>
+          <p:cNvPicPr>
+            <a:picLocks noGrp="1" noChangeAspect="1"/>
+          </p:cNvPicPr>
+          <p:nvPr>
+            <p:ph type="pic" sz="quarter" idx="12"/>
+          </p:nvPr>
+        </p:nvPicPr>
+        <p:blipFill>
+          <a:blip r:embed="rId2">
+            <a:extLst>
+              <a:ext uri="{28A0092B-C50C-407E-A947-70E740481C1C}">
+                <a14:useLocalDpi xmlns:a14="http://schemas.microsoft.com/office/drawing/2010/main"/>
+              </a:ext>
+            </a:extLst>
+          </a:blip>
+          <a:srcRect t="3112" b="3112"/>
+          <a:stretch>
+            <a:fillRect/>
+          </a:stretch>
+        </p:blipFill>
+        <p:spPr bwMode="invGray">
+          <a:xfrm>
+            <a:off x="0" y="3427200"/>
+            <a:ext cx="12195175" cy="3430800"/>
+          </a:xfrm>
+        </p:spPr>
+      </p:pic>
     </p:spTree>
     <p:extLst>
       <p:ext uri="{BB962C8B-B14F-4D97-AF65-F5344CB8AC3E}">
-        <p14:creationId xmlns:p14="http://schemas.microsoft.com/office/powerpoint/2010/main" val="3602749482"/>
+        <p14:creationId xmlns:p14="http://schemas.microsoft.com/office/powerpoint/2010/main" val="3329515361"/>
       </p:ext>
     </p:extLst>
   </p:cSld>
@@ -11266,7 +10994,7 @@
         <p:spPr>
           <a:xfrm>
             <a:off x="504001" y="504000"/>
-            <a:ext cx="11186476" cy="677108"/>
+            <a:ext cx="11186476" cy="369332"/>
           </a:xfrm>
         </p:spPr>
         <p:txBody>
@@ -11274,15 +11002,16 @@
           <a:lstStyle/>
           <a:p>
             <a:r>
-              <a:rPr lang="en-US" dirty="0"/>
-              <a:t>Insert page title (sentence case)</a:t>
-            </a:r>
-            <a:br>
-              <a:rPr lang="en-US" dirty="0"/>
-            </a:br>
-            <a:r>
-              <a:rPr lang="en-US" sz="2000" b="0" dirty="0" err="1"/>
-              <a:t>Subheadline</a:t>
+              <a:rPr lang="en-US" dirty="0" err="1"/>
+              <a:t>Slajdy</a:t>
+            </a:r>
+            <a:r>
+              <a:rPr lang="en-US" dirty="0"/>
+              <a:t> od </a:t>
+            </a:r>
+            <a:r>
+              <a:rPr lang="en-US" dirty="0" err="1"/>
+              <a:t>Tomków</a:t>
             </a:r>
             <a:endParaRPr lang="en-US" sz="2000" b="0" dirty="0"/>
           </a:p>
@@ -11320,12 +11049,12 @@
       </p:grpSpPr>
       <p:sp>
         <p:nvSpPr>
-          <p:cNvPr id="2" name="Quote placeholder"/>
+          <p:cNvPr id="3" name="Divider"/>
           <p:cNvSpPr>
             <a:spLocks noGrp="1"/>
           </p:cNvSpPr>
           <p:nvPr>
-            <p:ph type="body" sz="quarter" idx="10"/>
+            <p:ph type="ctrTitle"/>
           </p:nvPr>
         </p:nvSpPr>
         <p:spPr/>
@@ -11333,37 +11062,55 @@
           <a:bodyPr/>
           <a:lstStyle/>
           <a:p>
-            <a:pPr lvl="0"/>
-            <a:r>
-              <a:rPr lang="en-US" dirty="0"/>
-              <a:t>“Quote goes here and here </a:t>
-            </a:r>
             <a:r>
               <a:rPr lang="en-US" dirty="0">
                 <a:solidFill>
                   <a:schemeClr val="accent1"/>
                 </a:solidFill>
               </a:rPr>
-              <a:t>and here</a:t>
-            </a:r>
-            <a:r>
-              <a:rPr lang="en-US" dirty="0"/>
-              <a:t>.”</a:t>
-            </a:r>
-          </a:p>
-          <a:p>
-            <a:pPr lvl="1"/>
-            <a:r>
-              <a:rPr lang="en-US" dirty="0"/>
-              <a:t>Source</a:t>
+              <a:t>Helm </a:t>
+            </a:r>
+            <a:r>
+              <a:rPr lang="en-US" dirty="0"/>
+              <a:t>– The package manager for Kubernetes</a:t>
             </a:r>
           </a:p>
         </p:txBody>
       </p:sp>
+      <p:pic>
+        <p:nvPicPr>
+          <p:cNvPr id="6" name="Illustration" descr="Example of an illustration " title="Illustration for divider page"/>
+          <p:cNvPicPr>
+            <a:picLocks noGrp="1" noChangeAspect="1"/>
+          </p:cNvPicPr>
+          <p:nvPr>
+            <p:ph type="pic" sz="quarter" idx="12"/>
+          </p:nvPr>
+        </p:nvPicPr>
+        <p:blipFill>
+          <a:blip r:embed="rId2">
+            <a:extLst>
+              <a:ext uri="{28A0092B-C50C-407E-A947-70E740481C1C}">
+                <a14:useLocalDpi xmlns:a14="http://schemas.microsoft.com/office/drawing/2010/main"/>
+              </a:ext>
+            </a:extLst>
+          </a:blip>
+          <a:srcRect t="3112" b="3112"/>
+          <a:stretch>
+            <a:fillRect/>
+          </a:stretch>
+        </p:blipFill>
+        <p:spPr bwMode="invGray">
+          <a:xfrm>
+            <a:off x="0" y="3427200"/>
+            <a:ext cx="12195175" cy="3430800"/>
+          </a:xfrm>
+        </p:spPr>
+      </p:pic>
     </p:spTree>
     <p:extLst>
       <p:ext uri="{BB962C8B-B14F-4D97-AF65-F5344CB8AC3E}">
-        <p14:creationId xmlns:p14="http://schemas.microsoft.com/office/powerpoint/2010/main" val="1801416843"/>
+        <p14:creationId xmlns:p14="http://schemas.microsoft.com/office/powerpoint/2010/main" val="1160188901"/>
       </p:ext>
     </p:extLst>
   </p:cSld>
@@ -11392,49 +11139,592 @@
       </p:grpSpPr>
       <p:sp>
         <p:nvSpPr>
-          <p:cNvPr id="11" name="Quote placeholder"/>
+          <p:cNvPr id="4" name="Text Placeholder"/>
           <p:cNvSpPr>
             <a:spLocks noGrp="1"/>
           </p:cNvSpPr>
           <p:nvPr>
-            <p:ph type="body" sz="quarter" idx="10"/>
+            <p:ph type="body" sz="quarter" idx="11"/>
           </p:nvPr>
         </p:nvSpPr>
-        <p:spPr/>
+        <p:spPr>
+          <a:xfrm>
+            <a:off x="504001" y="1308715"/>
+            <a:ext cx="7092000" cy="4716000"/>
+          </a:xfrm>
+        </p:spPr>
         <p:txBody>
           <a:bodyPr/>
           <a:lstStyle/>
           <a:p>
             <a:pPr lvl="0"/>
             <a:r>
-              <a:rPr lang="en-US" dirty="0"/>
-              <a:t>“Quote goes here and here </a:t>
-            </a:r>
-            <a:r>
-              <a:rPr lang="en-US" dirty="0">
+              <a:rPr lang="pl-PL" dirty="0"/>
+              <a:t>„ </a:t>
+            </a:r>
+            <a:r>
+              <a:rPr lang="pl-PL" dirty="0" err="1"/>
+              <a:t>Helm</a:t>
+            </a:r>
+            <a:r>
+              <a:rPr lang="pl-PL" dirty="0"/>
+              <a:t> </a:t>
+            </a:r>
+            <a:r>
+              <a:rPr lang="pl-PL" dirty="0" err="1"/>
+              <a:t>is</a:t>
+            </a:r>
+            <a:r>
+              <a:rPr lang="pl-PL" dirty="0"/>
+              <a:t> a </a:t>
+            </a:r>
+            <a:r>
+              <a:rPr lang="pl-PL" dirty="0" err="1"/>
+              <a:t>tool</a:t>
+            </a:r>
+            <a:r>
+              <a:rPr lang="pl-PL" dirty="0"/>
+              <a:t> </a:t>
+            </a:r>
+            <a:r>
+              <a:rPr lang="pl-PL" dirty="0" err="1"/>
+              <a:t>that</a:t>
+            </a:r>
+            <a:r>
+              <a:rPr lang="pl-PL" dirty="0"/>
+              <a:t> </a:t>
+            </a:r>
+            <a:r>
+              <a:rPr lang="pl-PL" dirty="0" err="1"/>
+              <a:t>streamlines</a:t>
+            </a:r>
+            <a:r>
+              <a:rPr lang="pl-PL" dirty="0"/>
+              <a:t> </a:t>
+            </a:r>
+            <a:r>
+              <a:rPr lang="pl-PL" dirty="0" err="1"/>
+              <a:t>installing</a:t>
+            </a:r>
+            <a:r>
+              <a:rPr lang="pl-PL" dirty="0"/>
+              <a:t> and </a:t>
+            </a:r>
+            <a:r>
+              <a:rPr lang="pl-PL" dirty="0" err="1"/>
+              <a:t>managing</a:t>
+            </a:r>
+            <a:r>
+              <a:rPr lang="pl-PL" dirty="0"/>
+              <a:t> </a:t>
+            </a:r>
+            <a:r>
+              <a:rPr lang="pl-PL" dirty="0" err="1"/>
+              <a:t>Kubernetes</a:t>
+            </a:r>
+            <a:r>
+              <a:rPr lang="pl-PL" dirty="0"/>
+              <a:t> </a:t>
+            </a:r>
+            <a:r>
+              <a:rPr lang="pl-PL" dirty="0" err="1"/>
+              <a:t>applications</a:t>
+            </a:r>
+            <a:r>
+              <a:rPr lang="pl-PL" dirty="0"/>
+              <a:t>. </a:t>
+            </a:r>
+            <a:r>
+              <a:rPr lang="pl-PL" dirty="0" err="1"/>
+              <a:t>Think</a:t>
+            </a:r>
+            <a:r>
+              <a:rPr lang="pl-PL" dirty="0"/>
+              <a:t> of </a:t>
+            </a:r>
+            <a:r>
+              <a:rPr lang="pl-PL" dirty="0" err="1"/>
+              <a:t>it</a:t>
+            </a:r>
+            <a:r>
+              <a:rPr lang="pl-PL" dirty="0"/>
+              <a:t> </a:t>
+            </a:r>
+            <a:r>
+              <a:rPr lang="pl-PL" dirty="0" err="1"/>
+              <a:t>like</a:t>
+            </a:r>
+            <a:r>
+              <a:rPr lang="pl-PL" dirty="0"/>
+              <a:t> </a:t>
+            </a:r>
+            <a:r>
+              <a:rPr lang="pl-PL" dirty="0" err="1"/>
+              <a:t>apt</a:t>
+            </a:r>
+            <a:r>
+              <a:rPr lang="pl-PL" dirty="0"/>
+              <a:t>/</a:t>
+            </a:r>
+            <a:r>
+              <a:rPr lang="pl-PL" dirty="0" err="1"/>
+              <a:t>yum</a:t>
+            </a:r>
+            <a:r>
+              <a:rPr lang="pl-PL" dirty="0"/>
+              <a:t>/</a:t>
+            </a:r>
+            <a:r>
+              <a:rPr lang="pl-PL" dirty="0" err="1"/>
+              <a:t>homebrew</a:t>
+            </a:r>
+            <a:r>
+              <a:rPr lang="pl-PL" dirty="0"/>
+              <a:t> for </a:t>
+            </a:r>
+            <a:r>
+              <a:rPr lang="pl-PL" dirty="0" err="1"/>
+              <a:t>Kubernetes</a:t>
+            </a:r>
+            <a:r>
+              <a:rPr lang="pl-PL" dirty="0"/>
+              <a:t>.”</a:t>
+            </a:r>
+          </a:p>
+          <a:p>
+            <a:pPr marL="342900" indent="-342900">
+              <a:buFont typeface="Arial" panose="020B0604020202020204" pitchFamily="34" charset="0"/>
+              <a:buChar char="•"/>
+            </a:pPr>
+            <a:r>
+              <a:rPr lang="pl-PL" dirty="0" err="1"/>
+              <a:t>Helm</a:t>
+            </a:r>
+            <a:r>
+              <a:rPr lang="pl-PL" dirty="0"/>
+              <a:t> </a:t>
+            </a:r>
+            <a:r>
+              <a:rPr lang="pl-PL" dirty="0" err="1"/>
+              <a:t>has</a:t>
+            </a:r>
+            <a:r>
+              <a:rPr lang="pl-PL" dirty="0"/>
+              <a:t> </a:t>
+            </a:r>
+            <a:r>
+              <a:rPr lang="pl-PL" dirty="0" err="1"/>
+              <a:t>two</a:t>
+            </a:r>
+            <a:r>
+              <a:rPr lang="pl-PL" dirty="0"/>
+              <a:t> </a:t>
+            </a:r>
+            <a:r>
+              <a:rPr lang="pl-PL" dirty="0" err="1"/>
+              <a:t>parts</a:t>
+            </a:r>
+            <a:r>
+              <a:rPr lang="pl-PL" dirty="0"/>
+              <a:t>: a </a:t>
+            </a:r>
+            <a:r>
+              <a:rPr lang="pl-PL" dirty="0" err="1"/>
+              <a:t>client</a:t>
+            </a:r>
+            <a:r>
+              <a:rPr lang="pl-PL" dirty="0"/>
+              <a:t> (</a:t>
+            </a:r>
+            <a:r>
+              <a:rPr lang="pl-PL" dirty="0" err="1">
                 <a:solidFill>
                   <a:schemeClr val="accent1"/>
                 </a:solidFill>
               </a:rPr>
-              <a:t>and here</a:t>
-            </a:r>
-            <a:r>
-              <a:rPr lang="en-US" dirty="0"/>
-              <a:t>.”</a:t>
-            </a:r>
-          </a:p>
-          <a:p>
-            <a:pPr lvl="1"/>
-            <a:r>
-              <a:rPr lang="en-US" dirty="0"/>
-              <a:t>Source</a:t>
-            </a:r>
+              <a:t>helm</a:t>
+            </a:r>
+            <a:r>
+              <a:rPr lang="pl-PL" dirty="0"/>
+              <a:t>) and a </a:t>
+            </a:r>
+            <a:r>
+              <a:rPr lang="pl-PL" dirty="0" err="1"/>
+              <a:t>server</a:t>
+            </a:r>
+            <a:r>
+              <a:rPr lang="pl-PL" dirty="0"/>
+              <a:t> (</a:t>
+            </a:r>
+            <a:r>
+              <a:rPr lang="pl-PL" dirty="0" err="1">
+                <a:solidFill>
+                  <a:schemeClr val="accent1"/>
+                </a:solidFill>
+              </a:rPr>
+              <a:t>tiller</a:t>
+            </a:r>
+            <a:r>
+              <a:rPr lang="pl-PL" dirty="0"/>
+              <a:t>)</a:t>
+            </a:r>
+          </a:p>
+          <a:p>
+            <a:pPr marL="342900" indent="-342900">
+              <a:buFont typeface="Arial" panose="020B0604020202020204" pitchFamily="34" charset="0"/>
+              <a:buChar char="•"/>
+            </a:pPr>
+            <a:r>
+              <a:rPr lang="pl-PL" dirty="0" err="1"/>
+              <a:t>Tiller</a:t>
+            </a:r>
+            <a:r>
+              <a:rPr lang="pl-PL" dirty="0"/>
+              <a:t> </a:t>
+            </a:r>
+            <a:r>
+              <a:rPr lang="pl-PL" dirty="0" err="1"/>
+              <a:t>runs</a:t>
+            </a:r>
+            <a:r>
+              <a:rPr lang="pl-PL" dirty="0"/>
+              <a:t> </a:t>
+            </a:r>
+            <a:r>
+              <a:rPr lang="pl-PL" dirty="0" err="1"/>
+              <a:t>inside</a:t>
+            </a:r>
+            <a:r>
+              <a:rPr lang="pl-PL" dirty="0"/>
+              <a:t> of </a:t>
+            </a:r>
+            <a:r>
+              <a:rPr lang="pl-PL" dirty="0" err="1"/>
+              <a:t>your</a:t>
+            </a:r>
+            <a:r>
+              <a:rPr lang="pl-PL" dirty="0"/>
+              <a:t> </a:t>
+            </a:r>
+            <a:r>
+              <a:rPr lang="pl-PL" dirty="0" err="1"/>
+              <a:t>Kubernetes</a:t>
+            </a:r>
+            <a:r>
+              <a:rPr lang="pl-PL" dirty="0"/>
+              <a:t> </a:t>
+            </a:r>
+            <a:r>
+              <a:rPr lang="pl-PL" dirty="0" err="1"/>
+              <a:t>cluster</a:t>
+            </a:r>
+            <a:r>
+              <a:rPr lang="pl-PL" dirty="0"/>
+              <a:t>, and </a:t>
+            </a:r>
+            <a:r>
+              <a:rPr lang="pl-PL" dirty="0" err="1"/>
+              <a:t>manages</a:t>
+            </a:r>
+            <a:r>
+              <a:rPr lang="pl-PL" dirty="0"/>
+              <a:t> </a:t>
+            </a:r>
+            <a:r>
+              <a:rPr lang="pl-PL" dirty="0" err="1">
+                <a:solidFill>
+                  <a:schemeClr val="accent1"/>
+                </a:solidFill>
+              </a:rPr>
+              <a:t>releases</a:t>
+            </a:r>
+            <a:r>
+              <a:rPr lang="pl-PL" dirty="0"/>
+              <a:t> (</a:t>
+            </a:r>
+            <a:r>
+              <a:rPr lang="pl-PL" dirty="0" err="1"/>
+              <a:t>installations</a:t>
+            </a:r>
+            <a:r>
+              <a:rPr lang="pl-PL" dirty="0"/>
+              <a:t>) of </a:t>
+            </a:r>
+            <a:r>
+              <a:rPr lang="pl-PL" dirty="0" err="1"/>
+              <a:t>your</a:t>
+            </a:r>
+            <a:r>
+              <a:rPr lang="pl-PL" dirty="0"/>
+              <a:t> </a:t>
+            </a:r>
+            <a:r>
+              <a:rPr lang="pl-PL" dirty="0" err="1"/>
+              <a:t>charts</a:t>
+            </a:r>
+            <a:r>
+              <a:rPr lang="pl-PL" dirty="0"/>
+              <a:t>.</a:t>
+            </a:r>
+          </a:p>
+          <a:p>
+            <a:pPr marL="342900" indent="-342900">
+              <a:buFont typeface="Arial" panose="020B0604020202020204" pitchFamily="34" charset="0"/>
+              <a:buChar char="•"/>
+            </a:pPr>
+            <a:r>
+              <a:rPr lang="pl-PL" dirty="0" err="1">
+                <a:solidFill>
+                  <a:schemeClr val="accent1"/>
+                </a:solidFill>
+              </a:rPr>
+              <a:t>Helm</a:t>
+            </a:r>
+            <a:r>
+              <a:rPr lang="pl-PL" dirty="0"/>
+              <a:t> </a:t>
+            </a:r>
+            <a:r>
+              <a:rPr lang="pl-PL" dirty="0" err="1"/>
+              <a:t>runs</a:t>
+            </a:r>
+            <a:r>
+              <a:rPr lang="pl-PL" dirty="0"/>
+              <a:t> on </a:t>
+            </a:r>
+            <a:r>
+              <a:rPr lang="pl-PL" dirty="0" err="1"/>
+              <a:t>your</a:t>
+            </a:r>
+            <a:r>
+              <a:rPr lang="pl-PL" dirty="0"/>
+              <a:t> laptop, CI/CD, </a:t>
+            </a:r>
+            <a:r>
+              <a:rPr lang="pl-PL" dirty="0" err="1"/>
+              <a:t>or</a:t>
+            </a:r>
+            <a:r>
+              <a:rPr lang="pl-PL" dirty="0"/>
+              <a:t> </a:t>
+            </a:r>
+            <a:r>
+              <a:rPr lang="pl-PL" dirty="0" err="1"/>
+              <a:t>wherever</a:t>
+            </a:r>
+            <a:r>
+              <a:rPr lang="pl-PL" dirty="0"/>
+              <a:t> </a:t>
+            </a:r>
+            <a:r>
+              <a:rPr lang="pl-PL" dirty="0" err="1"/>
+              <a:t>you</a:t>
+            </a:r>
+            <a:r>
+              <a:rPr lang="pl-PL" dirty="0"/>
+              <a:t> want </a:t>
+            </a:r>
+            <a:r>
+              <a:rPr lang="pl-PL" dirty="0" err="1"/>
+              <a:t>it</a:t>
+            </a:r>
+            <a:r>
+              <a:rPr lang="pl-PL" dirty="0"/>
+              <a:t> to run.</a:t>
+            </a:r>
+          </a:p>
+          <a:p>
+            <a:pPr marL="342900" lvl="0" indent="-342900">
+              <a:buFont typeface="Arial" panose="020B0604020202020204" pitchFamily="34" charset="0"/>
+              <a:buChar char="•"/>
+            </a:pPr>
+            <a:r>
+              <a:rPr lang="pl-PL" dirty="0" err="1"/>
+              <a:t>Charts</a:t>
+            </a:r>
+            <a:r>
+              <a:rPr lang="pl-PL" dirty="0"/>
+              <a:t> </a:t>
+            </a:r>
+            <a:r>
+              <a:rPr lang="pl-PL" dirty="0" err="1"/>
+              <a:t>are</a:t>
+            </a:r>
+            <a:r>
+              <a:rPr lang="pl-PL" dirty="0"/>
+              <a:t> </a:t>
+            </a:r>
+            <a:r>
+              <a:rPr lang="pl-PL" dirty="0" err="1"/>
+              <a:t>Helm</a:t>
+            </a:r>
+            <a:r>
+              <a:rPr lang="pl-PL" dirty="0"/>
+              <a:t> </a:t>
+            </a:r>
+            <a:r>
+              <a:rPr lang="pl-PL" dirty="0" err="1"/>
+              <a:t>packages</a:t>
+            </a:r>
+            <a:r>
+              <a:rPr lang="pl-PL" dirty="0"/>
+              <a:t> </a:t>
+            </a:r>
+            <a:r>
+              <a:rPr lang="pl-PL" dirty="0" err="1"/>
+              <a:t>that</a:t>
+            </a:r>
+            <a:r>
+              <a:rPr lang="pl-PL" dirty="0"/>
+              <a:t> </a:t>
+            </a:r>
+            <a:r>
+              <a:rPr lang="pl-PL" dirty="0" err="1"/>
+              <a:t>contain</a:t>
+            </a:r>
+            <a:r>
+              <a:rPr lang="pl-PL" dirty="0"/>
+              <a:t> </a:t>
+            </a:r>
+            <a:r>
+              <a:rPr lang="pl-PL" dirty="0" err="1"/>
+              <a:t>at</a:t>
+            </a:r>
+            <a:r>
+              <a:rPr lang="pl-PL" dirty="0"/>
+              <a:t> </a:t>
+            </a:r>
+            <a:r>
+              <a:rPr lang="pl-PL" dirty="0" err="1"/>
+              <a:t>least</a:t>
+            </a:r>
+            <a:r>
+              <a:rPr lang="pl-PL" dirty="0"/>
+              <a:t> </a:t>
+            </a:r>
+            <a:r>
+              <a:rPr lang="pl-PL" dirty="0" err="1"/>
+              <a:t>two</a:t>
+            </a:r>
+            <a:r>
+              <a:rPr lang="pl-PL" dirty="0"/>
+              <a:t> </a:t>
+            </a:r>
+            <a:r>
+              <a:rPr lang="pl-PL" dirty="0" err="1"/>
+              <a:t>things</a:t>
+            </a:r>
+            <a:r>
+              <a:rPr lang="pl-PL" dirty="0"/>
+              <a:t>:</a:t>
+            </a:r>
+          </a:p>
+          <a:p>
+            <a:pPr marL="522864" lvl="1" indent="-342900">
+              <a:buFont typeface="Arial" panose="020B0604020202020204" pitchFamily="34" charset="0"/>
+              <a:buChar char="•"/>
+            </a:pPr>
+            <a:r>
+              <a:rPr lang="pl-PL" dirty="0"/>
+              <a:t>A </a:t>
+            </a:r>
+            <a:r>
+              <a:rPr lang="pl-PL" dirty="0" err="1"/>
+              <a:t>description</a:t>
+            </a:r>
+            <a:r>
+              <a:rPr lang="pl-PL" dirty="0"/>
+              <a:t> of the </a:t>
+            </a:r>
+            <a:r>
+              <a:rPr lang="pl-PL" dirty="0" err="1"/>
+              <a:t>package</a:t>
+            </a:r>
+            <a:r>
+              <a:rPr lang="pl-PL" dirty="0"/>
+              <a:t> (</a:t>
+            </a:r>
+            <a:r>
+              <a:rPr lang="pl-PL" dirty="0" err="1">
+                <a:solidFill>
+                  <a:schemeClr val="accent1"/>
+                </a:solidFill>
+              </a:rPr>
+              <a:t>Chart.yaml</a:t>
+            </a:r>
+            <a:r>
+              <a:rPr lang="pl-PL" dirty="0"/>
+              <a:t>)</a:t>
+            </a:r>
+          </a:p>
+          <a:p>
+            <a:pPr marL="522864" lvl="1" indent="-342900">
+              <a:buFont typeface="Arial" panose="020B0604020202020204" pitchFamily="34" charset="0"/>
+              <a:buChar char="•"/>
+            </a:pPr>
+            <a:r>
+              <a:rPr lang="pl-PL" dirty="0"/>
+              <a:t>One </a:t>
+            </a:r>
+            <a:r>
+              <a:rPr lang="pl-PL" dirty="0" err="1"/>
+              <a:t>or</a:t>
+            </a:r>
+            <a:r>
+              <a:rPr lang="pl-PL" dirty="0"/>
+              <a:t> </a:t>
+            </a:r>
+            <a:r>
+              <a:rPr lang="pl-PL" dirty="0" err="1"/>
+              <a:t>more</a:t>
+            </a:r>
+            <a:r>
+              <a:rPr lang="pl-PL" dirty="0"/>
+              <a:t> </a:t>
+            </a:r>
+            <a:r>
+              <a:rPr lang="pl-PL" dirty="0" err="1"/>
+              <a:t>templates</a:t>
+            </a:r>
+            <a:r>
+              <a:rPr lang="pl-PL" dirty="0"/>
+              <a:t>, </a:t>
+            </a:r>
+            <a:r>
+              <a:rPr lang="pl-PL" dirty="0" err="1"/>
+              <a:t>which</a:t>
+            </a:r>
+            <a:r>
+              <a:rPr lang="pl-PL" dirty="0"/>
+              <a:t> </a:t>
+            </a:r>
+            <a:r>
+              <a:rPr lang="pl-PL" dirty="0" err="1"/>
+              <a:t>contain</a:t>
+            </a:r>
+            <a:r>
+              <a:rPr lang="pl-PL" dirty="0"/>
+              <a:t> </a:t>
+            </a:r>
+            <a:r>
+              <a:rPr lang="pl-PL" dirty="0" err="1"/>
+              <a:t>Kubernetes</a:t>
+            </a:r>
+            <a:r>
+              <a:rPr lang="pl-PL" dirty="0"/>
+              <a:t> manifest </a:t>
+            </a:r>
+            <a:r>
+              <a:rPr lang="pl-PL" dirty="0" err="1"/>
+              <a:t>files</a:t>
+            </a:r>
+            <a:endParaRPr lang="en-US" dirty="0"/>
           </a:p>
         </p:txBody>
       </p:sp>
       <p:sp>
         <p:nvSpPr>
-          <p:cNvPr id="4" name="Title"/>
+          <p:cNvPr id="2" name="Title"/>
           <p:cNvSpPr>
             <a:spLocks noGrp="1"/>
           </p:cNvSpPr>
@@ -11449,15 +11739,51 @@
           <a:p>
             <a:r>
               <a:rPr lang="en-US" dirty="0"/>
-              <a:t>Insert page title (sentence case)</a:t>
+              <a:t>What is Helm?</a:t>
             </a:r>
           </a:p>
         </p:txBody>
       </p:sp>
+      <p:pic>
+        <p:nvPicPr>
+          <p:cNvPr id="10" name="Grafika 9">
+            <a:extLst>
+              <a:ext uri="{FF2B5EF4-FFF2-40B4-BE49-F238E27FC236}">
+                <a16:creationId xmlns:a16="http://schemas.microsoft.com/office/drawing/2014/main" id="{20927F37-BA76-3E4D-9275-DA88DF643A71}"/>
+              </a:ext>
+            </a:extLst>
+          </p:cNvPr>
+          <p:cNvPicPr>
+            <a:picLocks noChangeAspect="1"/>
+          </p:cNvPicPr>
+          <p:nvPr/>
+        </p:nvPicPr>
+        <p:blipFill>
+          <a:blip r:embed="rId2">
+            <a:extLst>
+              <a:ext uri="{96DAC541-7B7A-43D3-8B79-37D633B846F1}">
+                <asvg:svgBlip xmlns:asvg="http://schemas.microsoft.com/office/drawing/2016/SVG/main" r:embed="rId3"/>
+              </a:ext>
+            </a:extLst>
+          </a:blip>
+          <a:stretch>
+            <a:fillRect/>
+          </a:stretch>
+        </p:blipFill>
+        <p:spPr>
+          <a:xfrm>
+            <a:off x="7733490" y="873332"/>
+            <a:ext cx="4094411" cy="4226490"/>
+          </a:xfrm>
+          <a:prstGeom prst="rect">
+            <a:avLst/>
+          </a:prstGeom>
+        </p:spPr>
+      </p:pic>
     </p:spTree>
     <p:extLst>
       <p:ext uri="{BB962C8B-B14F-4D97-AF65-F5344CB8AC3E}">
-        <p14:creationId xmlns:p14="http://schemas.microsoft.com/office/powerpoint/2010/main" val="3295641251"/>
+        <p14:creationId xmlns:p14="http://schemas.microsoft.com/office/powerpoint/2010/main" val="2468716513"/>
       </p:ext>
     </p:extLst>
   </p:cSld>
@@ -11486,18 +11812,6 @@
       </p:grpSpPr>
       <p:sp>
         <p:nvSpPr>
-          <p:cNvPr id="6" name="Picture Placeholder" descr="Placeholder for an image" title="Image placeholder content slide"/>
-          <p:cNvSpPr>
-            <a:spLocks noGrp="1"/>
-          </p:cNvSpPr>
-          <p:nvPr>
-            <p:ph type="pic" sz="quarter" idx="10"/>
-          </p:nvPr>
-        </p:nvSpPr>
-        <p:spPr/>
-      </p:sp>
-      <p:sp>
-        <p:nvSpPr>
           <p:cNvPr id="4" name="Text Placeholder"/>
           <p:cNvSpPr>
             <a:spLocks noGrp="1"/>
@@ -11513,24 +11827,83 @@
           <a:p>
             <a:pPr lvl="0"/>
             <a:r>
-              <a:rPr lang="en-US"/>
-              <a:t>First level</a:t>
-            </a:r>
-          </a:p>
-          <a:p>
-            <a:pPr lvl="1"/>
-            <a:r>
-              <a:rPr lang="en-US"/>
-              <a:t>Second level</a:t>
-            </a:r>
-          </a:p>
-          <a:p>
-            <a:pPr lvl="2"/>
-            <a:r>
-              <a:rPr lang="en-US"/>
-              <a:t>Third level</a:t>
-            </a:r>
-            <a:endParaRPr lang="en-US" dirty="0"/>
+              <a:rPr lang="en-US" dirty="0" err="1">
+                <a:solidFill>
+                  <a:schemeClr val="accent1"/>
+                </a:solidFill>
+              </a:rPr>
+              <a:t>Chart.yaml</a:t>
+            </a:r>
+            <a:r>
+              <a:rPr lang="en-US" dirty="0"/>
+              <a:t> – Metadata of the chart (name, version, maintainers)</a:t>
+            </a:r>
+          </a:p>
+          <a:p>
+            <a:pPr lvl="0"/>
+            <a:r>
+              <a:rPr lang="en-US" dirty="0">
+                <a:solidFill>
+                  <a:schemeClr val="accent1"/>
+                </a:solidFill>
+              </a:rPr>
+              <a:t>Charts directory </a:t>
+            </a:r>
+            <a:r>
+              <a:rPr lang="en-US" dirty="0"/>
+              <a:t>– Your local dependencies </a:t>
+            </a:r>
+          </a:p>
+          <a:p>
+            <a:pPr lvl="0"/>
+            <a:r>
+              <a:rPr lang="en-US" dirty="0">
+                <a:solidFill>
+                  <a:schemeClr val="accent1"/>
+                </a:solidFill>
+              </a:rPr>
+              <a:t>Templates directory </a:t>
+            </a:r>
+            <a:r>
+              <a:rPr lang="en-US" dirty="0"/>
+              <a:t>– Your code: </a:t>
+            </a:r>
+            <a:r>
+              <a:rPr lang="en-US" dirty="0" err="1"/>
+              <a:t>kubernetes</a:t>
+            </a:r>
+            <a:r>
+              <a:rPr lang="en-US" dirty="0"/>
+              <a:t> manifests + go based templates </a:t>
+            </a:r>
+          </a:p>
+          <a:p>
+            <a:pPr lvl="0"/>
+            <a:r>
+              <a:rPr lang="en-US" dirty="0" err="1">
+                <a:solidFill>
+                  <a:schemeClr val="accent1"/>
+                </a:solidFill>
+              </a:rPr>
+              <a:t>Values.yaml</a:t>
+            </a:r>
+            <a:r>
+              <a:rPr lang="en-US" dirty="0">
+                <a:solidFill>
+                  <a:schemeClr val="accent1"/>
+                </a:solidFill>
+              </a:rPr>
+              <a:t> </a:t>
+            </a:r>
+            <a:r>
+              <a:rPr lang="en-US" dirty="0"/>
+              <a:t>– Your default values. </a:t>
+            </a:r>
+            <a:endParaRPr lang="en-US" dirty="0">
+              <a:solidFill>
+                <a:schemeClr val="accent1"/>
+              </a:solidFill>
+            </a:endParaRPr>
           </a:p>
         </p:txBody>
       </p:sp>
@@ -11551,15 +11924,111 @@
           <a:p>
             <a:r>
               <a:rPr lang="en-US" dirty="0"/>
-              <a:t>Insert page title (sentence case)</a:t>
+              <a:t>Example Chart structure</a:t>
             </a:r>
           </a:p>
         </p:txBody>
       </p:sp>
+      <p:pic>
+        <p:nvPicPr>
+          <p:cNvPr id="14" name="Obraz 13">
+            <a:extLst>
+              <a:ext uri="{FF2B5EF4-FFF2-40B4-BE49-F238E27FC236}">
+                <a16:creationId xmlns:a16="http://schemas.microsoft.com/office/drawing/2014/main" id="{EFF4AA23-243E-FF4E-95B7-FBEF0CADF621}"/>
+              </a:ext>
+            </a:extLst>
+          </p:cNvPr>
+          <p:cNvPicPr>
+            <a:picLocks noChangeAspect="1"/>
+          </p:cNvPicPr>
+          <p:nvPr/>
+        </p:nvPicPr>
+        <p:blipFill>
+          <a:blip r:embed="rId2"/>
+          <a:stretch>
+            <a:fillRect/>
+          </a:stretch>
+        </p:blipFill>
+        <p:spPr>
+          <a:xfrm>
+            <a:off x="5615999" y="0"/>
+            <a:ext cx="3035300" cy="2120900"/>
+          </a:xfrm>
+          <a:prstGeom prst="rect">
+            <a:avLst/>
+          </a:prstGeom>
+          <a:effectLst>
+            <a:softEdge rad="63500"/>
+          </a:effectLst>
+        </p:spPr>
+      </p:pic>
+      <p:pic>
+        <p:nvPicPr>
+          <p:cNvPr id="16" name="Obraz 15">
+            <a:extLst>
+              <a:ext uri="{FF2B5EF4-FFF2-40B4-BE49-F238E27FC236}">
+                <a16:creationId xmlns:a16="http://schemas.microsoft.com/office/drawing/2014/main" id="{5E188A53-6C5D-114B-9604-C7CBB4F1AC28}"/>
+              </a:ext>
+            </a:extLst>
+          </p:cNvPr>
+          <p:cNvPicPr>
+            <a:picLocks noChangeAspect="1"/>
+          </p:cNvPicPr>
+          <p:nvPr/>
+        </p:nvPicPr>
+        <p:blipFill>
+          <a:blip r:embed="rId3"/>
+          <a:stretch>
+            <a:fillRect/>
+          </a:stretch>
+        </p:blipFill>
+        <p:spPr>
+          <a:xfrm>
+            <a:off x="5615999" y="2253854"/>
+            <a:ext cx="6235700" cy="1905000"/>
+          </a:xfrm>
+          <a:prstGeom prst="rect">
+            <a:avLst/>
+          </a:prstGeom>
+          <a:effectLst>
+            <a:softEdge rad="12700"/>
+          </a:effectLst>
+        </p:spPr>
+      </p:pic>
+      <p:pic>
+        <p:nvPicPr>
+          <p:cNvPr id="18" name="Obraz 17">
+            <a:extLst>
+              <a:ext uri="{FF2B5EF4-FFF2-40B4-BE49-F238E27FC236}">
+                <a16:creationId xmlns:a16="http://schemas.microsoft.com/office/drawing/2014/main" id="{D6268B11-9EFF-0B49-AAE2-A4837EAEA193}"/>
+              </a:ext>
+            </a:extLst>
+          </p:cNvPr>
+          <p:cNvPicPr>
+            <a:picLocks noChangeAspect="1"/>
+          </p:cNvPicPr>
+          <p:nvPr/>
+        </p:nvPicPr>
+        <p:blipFill>
+          <a:blip r:embed="rId4"/>
+          <a:stretch>
+            <a:fillRect/>
+          </a:stretch>
+        </p:blipFill>
+        <p:spPr>
+          <a:xfrm>
+            <a:off x="5615999" y="4322654"/>
+            <a:ext cx="2247900" cy="2146300"/>
+          </a:xfrm>
+          <a:prstGeom prst="rect">
+            <a:avLst/>
+          </a:prstGeom>
+        </p:spPr>
+      </p:pic>
     </p:spTree>
     <p:extLst>
       <p:ext uri="{BB962C8B-B14F-4D97-AF65-F5344CB8AC3E}">
-        <p14:creationId xmlns:p14="http://schemas.microsoft.com/office/powerpoint/2010/main" val="2468716513"/>
+        <p14:creationId xmlns:p14="http://schemas.microsoft.com/office/powerpoint/2010/main" val="4154867534"/>
       </p:ext>
     </p:extLst>
   </p:cSld>

</xml_diff>